<commit_message>
Good first draft of solid structure table
</commit_message>
<xml_diff>
--- a/_drafts/Solid Structure Table.pptx
+++ b/_drafts/Solid Structure Table.pptx
@@ -6,6 +6,7 @@
   </p:sldMasterIdLst>
   <p:sldIdLst>
     <p:sldId id="256" r:id="rId2"/>
+    <p:sldId id="257" r:id="rId3"/>
   </p:sldIdLst>
   <p:sldSz cx="12192000" cy="6858000"/>
   <p:notesSz cx="6858000" cy="9144000"/>
@@ -104,6 +105,11 @@
       </a:defRPr>
     </a:lvl9pPr>
   </p:defaultTextStyle>
+  <p:extLst>
+    <p:ext uri="{EFAFB233-063F-42B5-8137-9DF3F51BA10A}">
+      <p15:sldGuideLst xmlns:p15="http://schemas.microsoft.com/office/powerpoint/2012/main"/>
+    </p:ext>
+  </p:extLst>
 </p:presentation>
 </file>
 
@@ -254,7 +260,7 @@
           <a:p>
             <a:fld id="{C8935D48-1B7A-4328-8A92-3989B43617AB}" type="datetimeFigureOut">
               <a:rPr lang="en-US" smtClean="0"/>
-              <a:t>8/4/2020</a:t>
+              <a:t>8/6/2020</a:t>
             </a:fld>
             <a:endParaRPr lang="en-US"/>
           </a:p>
@@ -452,7 +458,7 @@
           <a:p>
             <a:fld id="{C8935D48-1B7A-4328-8A92-3989B43617AB}" type="datetimeFigureOut">
               <a:rPr lang="en-US" smtClean="0"/>
-              <a:t>8/4/2020</a:t>
+              <a:t>8/6/2020</a:t>
             </a:fld>
             <a:endParaRPr lang="en-US"/>
           </a:p>
@@ -660,7 +666,7 @@
           <a:p>
             <a:fld id="{C8935D48-1B7A-4328-8A92-3989B43617AB}" type="datetimeFigureOut">
               <a:rPr lang="en-US" smtClean="0"/>
-              <a:t>8/4/2020</a:t>
+              <a:t>8/6/2020</a:t>
             </a:fld>
             <a:endParaRPr lang="en-US"/>
           </a:p>
@@ -858,7 +864,7 @@
           <a:p>
             <a:fld id="{C8935D48-1B7A-4328-8A92-3989B43617AB}" type="datetimeFigureOut">
               <a:rPr lang="en-US" smtClean="0"/>
-              <a:t>8/4/2020</a:t>
+              <a:t>8/6/2020</a:t>
             </a:fld>
             <a:endParaRPr lang="en-US"/>
           </a:p>
@@ -1133,7 +1139,7 @@
           <a:p>
             <a:fld id="{C8935D48-1B7A-4328-8A92-3989B43617AB}" type="datetimeFigureOut">
               <a:rPr lang="en-US" smtClean="0"/>
-              <a:t>8/4/2020</a:t>
+              <a:t>8/6/2020</a:t>
             </a:fld>
             <a:endParaRPr lang="en-US"/>
           </a:p>
@@ -1398,7 +1404,7 @@
           <a:p>
             <a:fld id="{C8935D48-1B7A-4328-8A92-3989B43617AB}" type="datetimeFigureOut">
               <a:rPr lang="en-US" smtClean="0"/>
-              <a:t>8/4/2020</a:t>
+              <a:t>8/6/2020</a:t>
             </a:fld>
             <a:endParaRPr lang="en-US"/>
           </a:p>
@@ -1810,7 +1816,7 @@
           <a:p>
             <a:fld id="{C8935D48-1B7A-4328-8A92-3989B43617AB}" type="datetimeFigureOut">
               <a:rPr lang="en-US" smtClean="0"/>
-              <a:t>8/4/2020</a:t>
+              <a:t>8/6/2020</a:t>
             </a:fld>
             <a:endParaRPr lang="en-US"/>
           </a:p>
@@ -1951,7 +1957,7 @@
           <a:p>
             <a:fld id="{C8935D48-1B7A-4328-8A92-3989B43617AB}" type="datetimeFigureOut">
               <a:rPr lang="en-US" smtClean="0"/>
-              <a:t>8/4/2020</a:t>
+              <a:t>8/6/2020</a:t>
             </a:fld>
             <a:endParaRPr lang="en-US"/>
           </a:p>
@@ -2064,7 +2070,7 @@
           <a:p>
             <a:fld id="{C8935D48-1B7A-4328-8A92-3989B43617AB}" type="datetimeFigureOut">
               <a:rPr lang="en-US" smtClean="0"/>
-              <a:t>8/4/2020</a:t>
+              <a:t>8/6/2020</a:t>
             </a:fld>
             <a:endParaRPr lang="en-US"/>
           </a:p>
@@ -2375,7 +2381,7 @@
           <a:p>
             <a:fld id="{C8935D48-1B7A-4328-8A92-3989B43617AB}" type="datetimeFigureOut">
               <a:rPr lang="en-US" smtClean="0"/>
-              <a:t>8/4/2020</a:t>
+              <a:t>8/6/2020</a:t>
             </a:fld>
             <a:endParaRPr lang="en-US"/>
           </a:p>
@@ -2663,7 +2669,7 @@
           <a:p>
             <a:fld id="{C8935D48-1B7A-4328-8A92-3989B43617AB}" type="datetimeFigureOut">
               <a:rPr lang="en-US" smtClean="0"/>
-              <a:t>8/4/2020</a:t>
+              <a:t>8/6/2020</a:t>
             </a:fld>
             <a:endParaRPr lang="en-US"/>
           </a:p>
@@ -2904,7 +2910,7 @@
           <a:p>
             <a:fld id="{C8935D48-1B7A-4328-8A92-3989B43617AB}" type="datetimeFigureOut">
               <a:rPr lang="en-US" smtClean="0"/>
-              <a:t>8/4/2020</a:t>
+              <a:t>8/6/2020</a:t>
             </a:fld>
             <a:endParaRPr lang="en-US"/>
           </a:p>
@@ -3336,13 +3342,13 @@
           <p:nvPr>
             <p:extLst>
               <p:ext uri="{D42A27DB-BD31-4B8C-83A1-F6EECF244321}">
-                <p14:modId xmlns:p14="http://schemas.microsoft.com/office/powerpoint/2010/main" val="1686900984"/>
+                <p14:modId xmlns:p14="http://schemas.microsoft.com/office/powerpoint/2010/main" val="2777564638"/>
               </p:ext>
             </p:extLst>
           </p:nvPr>
         </p:nvGraphicFramePr>
         <p:xfrm>
-          <a:off x="1857830" y="316193"/>
+          <a:off x="1848500" y="316193"/>
           <a:ext cx="7130577" cy="5144666"/>
         </p:xfrm>
         <a:graphic>
@@ -3381,10 +3387,7 @@
                     <a:lstStyle/>
                     <a:p>
                       <a:pPr algn="ctr"/>
-                      <a:r>
-                        <a:rPr lang="en-US" dirty="0"/>
-                        <a:t>Clients</a:t>
-                      </a:r>
+                      <a:endParaRPr lang="en-US" dirty="0"/>
                     </a:p>
                   </a:txBody>
                   <a:tcPr marL="137160" marR="137160" marT="137160" marB="137160" anchor="ctr"/>
@@ -3410,7 +3413,7 @@
                     </a:lnB>
                   </a:tcPr>
                 </a:tc>
-                <a:tc>
+                <a:tc rowSpan="4">
                   <a:txBody>
                     <a:bodyPr/>
                     <a:lstStyle/>
@@ -3421,12 +3424,12 @@
                         <a:t>Clients</a:t>
                       </a:r>
                     </a:p>
+                    <a:p>
+                      <a:pPr algn="ctr"/>
+                      <a:endParaRPr lang="en-US" dirty="0"/>
+                    </a:p>
                   </a:txBody>
-                  <a:tcPr marL="137160" marR="137160" marT="137160" marB="137160" anchor="ctr">
-                    <a:lnB w="12700" cmpd="sng">
-                      <a:noFill/>
-                    </a:lnB>
-                  </a:tcPr>
+                  <a:tcPr marL="137160" marR="137160" marT="137160" marB="137160" anchor="ctr"/>
                 </a:tc>
                 <a:extLst>
                   <a:ext uri="{0D108BD9-81ED-4DB2-BD59-A6C34878D82A}">
@@ -3441,10 +3444,7 @@
                     <a:lstStyle/>
                     <a:p>
                       <a:pPr algn="ctr"/>
-                      <a:r>
-                        <a:rPr lang="en-US" dirty="0"/>
-                        <a:t>Managers</a:t>
-                      </a:r>
+                      <a:endParaRPr lang="en-US" dirty="0"/>
                     </a:p>
                   </a:txBody>
                   <a:tcPr marL="137160" marR="137160" marT="137160" marB="137160" anchor="ctr"/>
@@ -3482,7 +3482,7 @@
                     </a:lnB>
                   </a:tcPr>
                 </a:tc>
-                <a:tc>
+                <a:tc vMerge="1">
                   <a:txBody>
                     <a:bodyPr/>
                     <a:lstStyle/>
@@ -3513,10 +3513,7 @@
                     <a:lstStyle/>
                     <a:p>
                       <a:pPr algn="ctr"/>
-                      <a:r>
-                        <a:rPr lang="en-US" dirty="0"/>
-                        <a:t>Engines</a:t>
-                      </a:r>
+                      <a:endParaRPr lang="en-US" dirty="0"/>
                     </a:p>
                   </a:txBody>
                   <a:tcPr marL="137160" marR="137160" marT="137160" marB="137160" anchor="ctr"/>
@@ -3554,7 +3551,7 @@
                     </a:lnB>
                   </a:tcPr>
                 </a:tc>
-                <a:tc>
+                <a:tc vMerge="1">
                   <a:txBody>
                     <a:bodyPr/>
                     <a:lstStyle/>
@@ -3585,10 +3582,7 @@
                     <a:lstStyle/>
                     <a:p>
                       <a:pPr algn="ctr"/>
-                      <a:r>
-                        <a:rPr lang="en-US" dirty="0"/>
-                        <a:t>Accessors</a:t>
-                      </a:r>
+                      <a:endParaRPr lang="en-US" dirty="0"/>
                     </a:p>
                   </a:txBody>
                   <a:tcPr marL="137160" marR="137160" marT="137160" marB="137160" anchor="ctr"/>
@@ -3614,7 +3608,7 @@
                     </a:lnT>
                   </a:tcPr>
                 </a:tc>
-                <a:tc>
+                <a:tc vMerge="1">
                   <a:txBody>
                     <a:bodyPr/>
                     <a:lstStyle/>
@@ -3697,7 +3691,7 @@
         </p:nvCxnSpPr>
         <p:spPr>
           <a:xfrm flipH="1">
-            <a:off x="1848500" y="5778100"/>
+            <a:off x="1848500" y="6169987"/>
             <a:ext cx="7108887" cy="0"/>
           </a:xfrm>
           <a:prstGeom prst="straightConnector1">
@@ -3723,10 +3717,892 @@
           </a:fontRef>
         </p:style>
       </p:cxnSp>
+      <p:sp>
+        <p:nvSpPr>
+          <p:cNvPr id="2" name="Rectangle 1">
+            <a:extLst>
+              <a:ext uri="{FF2B5EF4-FFF2-40B4-BE49-F238E27FC236}">
+                <a16:creationId xmlns:a16="http://schemas.microsoft.com/office/drawing/2014/main" id="{5312A636-CD78-468E-B540-96F787C85B31}"/>
+              </a:ext>
+            </a:extLst>
+          </p:cNvPr>
+          <p:cNvSpPr/>
+          <p:nvPr/>
+        </p:nvSpPr>
+        <p:spPr>
+          <a:xfrm>
+            <a:off x="2089379" y="4323973"/>
+            <a:ext cx="1853961" cy="931169"/>
+          </a:xfrm>
+          <a:prstGeom prst="rect">
+            <a:avLst/>
+          </a:prstGeom>
+          <a:solidFill>
+            <a:schemeClr val="bg1">
+              <a:lumMod val="75000"/>
+            </a:schemeClr>
+          </a:solidFill>
+          <a:ln>
+            <a:noFill/>
+          </a:ln>
+        </p:spPr>
+        <p:style>
+          <a:lnRef idx="2">
+            <a:schemeClr val="accent1">
+              <a:shade val="50000"/>
+            </a:schemeClr>
+          </a:lnRef>
+          <a:fillRef idx="1">
+            <a:schemeClr val="accent1"/>
+          </a:fillRef>
+          <a:effectRef idx="0">
+            <a:schemeClr val="accent1"/>
+          </a:effectRef>
+          <a:fontRef idx="minor">
+            <a:schemeClr val="lt1"/>
+          </a:fontRef>
+        </p:style>
+        <p:txBody>
+          <a:bodyPr rtlCol="0" anchor="ctr"/>
+          <a:lstStyle/>
+          <a:p>
+            <a:pPr algn="ctr"/>
+            <a:r>
+              <a:rPr lang="en-US" dirty="0">
+                <a:solidFill>
+                  <a:schemeClr val="tx1"/>
+                </a:solidFill>
+              </a:rPr>
+              <a:t>Accessors</a:t>
+            </a:r>
+          </a:p>
+          <a:p>
+            <a:pPr algn="ctr"/>
+            <a:r>
+              <a:rPr lang="en-US" sz="1400" dirty="0">
+                <a:solidFill>
+                  <a:schemeClr val="tx1"/>
+                </a:solidFill>
+              </a:rPr>
+              <a:t>(Atomic Actions)</a:t>
+            </a:r>
+          </a:p>
+        </p:txBody>
+      </p:sp>
+      <p:sp>
+        <p:nvSpPr>
+          <p:cNvPr id="3" name="Rectangle 2">
+            <a:extLst>
+              <a:ext uri="{FF2B5EF4-FFF2-40B4-BE49-F238E27FC236}">
+                <a16:creationId xmlns:a16="http://schemas.microsoft.com/office/drawing/2014/main" id="{6CA1CADB-F37B-4D4E-A079-FA981B394296}"/>
+              </a:ext>
+            </a:extLst>
+          </p:cNvPr>
+          <p:cNvSpPr/>
+          <p:nvPr/>
+        </p:nvSpPr>
+        <p:spPr>
+          <a:xfrm>
+            <a:off x="2089378" y="2926372"/>
+            <a:ext cx="1853961" cy="931169"/>
+          </a:xfrm>
+          <a:prstGeom prst="rect">
+            <a:avLst/>
+          </a:prstGeom>
+          <a:solidFill>
+            <a:schemeClr val="accent4"/>
+          </a:solidFill>
+          <a:ln>
+            <a:noFill/>
+          </a:ln>
+        </p:spPr>
+        <p:style>
+          <a:lnRef idx="2">
+            <a:schemeClr val="accent1">
+              <a:shade val="50000"/>
+            </a:schemeClr>
+          </a:lnRef>
+          <a:fillRef idx="1">
+            <a:schemeClr val="accent1"/>
+          </a:fillRef>
+          <a:effectRef idx="0">
+            <a:schemeClr val="accent1"/>
+          </a:effectRef>
+          <a:fontRef idx="minor">
+            <a:schemeClr val="lt1"/>
+          </a:fontRef>
+        </p:style>
+        <p:txBody>
+          <a:bodyPr rtlCol="0" anchor="ctr"/>
+          <a:lstStyle/>
+          <a:p>
+            <a:pPr algn="ctr"/>
+            <a:r>
+              <a:rPr lang="en-US" dirty="0">
+                <a:solidFill>
+                  <a:schemeClr val="tx1"/>
+                </a:solidFill>
+              </a:rPr>
+              <a:t>Engines</a:t>
+            </a:r>
+          </a:p>
+          <a:p>
+            <a:pPr algn="ctr"/>
+            <a:r>
+              <a:rPr lang="en-US" sz="1400" dirty="0">
+                <a:solidFill>
+                  <a:schemeClr val="tx1"/>
+                </a:solidFill>
+              </a:rPr>
+              <a:t>(Equivalent Calculations)</a:t>
+            </a:r>
+          </a:p>
+        </p:txBody>
+      </p:sp>
+      <p:sp>
+        <p:nvSpPr>
+          <p:cNvPr id="5" name="Rectangle 4">
+            <a:extLst>
+              <a:ext uri="{FF2B5EF4-FFF2-40B4-BE49-F238E27FC236}">
+                <a16:creationId xmlns:a16="http://schemas.microsoft.com/office/drawing/2014/main" id="{BDAD58BE-EDC4-4F35-94FD-E0458C0C5C78}"/>
+              </a:ext>
+            </a:extLst>
+          </p:cNvPr>
+          <p:cNvSpPr/>
+          <p:nvPr/>
+        </p:nvSpPr>
+        <p:spPr>
+          <a:xfrm>
+            <a:off x="2089378" y="1625871"/>
+            <a:ext cx="1853961" cy="931169"/>
+          </a:xfrm>
+          <a:prstGeom prst="rect">
+            <a:avLst/>
+          </a:prstGeom>
+          <a:solidFill>
+            <a:schemeClr val="accent4">
+              <a:lumMod val="60000"/>
+              <a:lumOff val="40000"/>
+            </a:schemeClr>
+          </a:solidFill>
+          <a:ln>
+            <a:noFill/>
+          </a:ln>
+        </p:spPr>
+        <p:style>
+          <a:lnRef idx="2">
+            <a:schemeClr val="accent1">
+              <a:shade val="50000"/>
+            </a:schemeClr>
+          </a:lnRef>
+          <a:fillRef idx="1">
+            <a:schemeClr val="accent1"/>
+          </a:fillRef>
+          <a:effectRef idx="0">
+            <a:schemeClr val="accent1"/>
+          </a:effectRef>
+          <a:fontRef idx="minor">
+            <a:schemeClr val="lt1"/>
+          </a:fontRef>
+        </p:style>
+        <p:txBody>
+          <a:bodyPr rtlCol="0" anchor="ctr"/>
+          <a:lstStyle/>
+          <a:p>
+            <a:pPr algn="ctr"/>
+            <a:r>
+              <a:rPr lang="en-US" dirty="0">
+                <a:solidFill>
+                  <a:schemeClr val="tx1"/>
+                </a:solidFill>
+              </a:rPr>
+              <a:t>Managers</a:t>
+            </a:r>
+          </a:p>
+          <a:p>
+            <a:pPr algn="ctr"/>
+            <a:r>
+              <a:rPr lang="en-US" sz="1400" dirty="0">
+                <a:solidFill>
+                  <a:schemeClr val="tx1"/>
+                </a:solidFill>
+              </a:rPr>
+              <a:t>(Use cases)</a:t>
+            </a:r>
+            <a:endParaRPr lang="en-US" dirty="0">
+              <a:solidFill>
+                <a:schemeClr val="tx1"/>
+              </a:solidFill>
+            </a:endParaRPr>
+          </a:p>
+        </p:txBody>
+      </p:sp>
+      <p:sp>
+        <p:nvSpPr>
+          <p:cNvPr id="11" name="Rectangle 10">
+            <a:extLst>
+              <a:ext uri="{FF2B5EF4-FFF2-40B4-BE49-F238E27FC236}">
+                <a16:creationId xmlns:a16="http://schemas.microsoft.com/office/drawing/2014/main" id="{045F2C5C-307D-4C8B-808D-FBFF1320B81E}"/>
+              </a:ext>
+            </a:extLst>
+          </p:cNvPr>
+          <p:cNvSpPr/>
+          <p:nvPr/>
+        </p:nvSpPr>
+        <p:spPr>
+          <a:xfrm>
+            <a:off x="2089378" y="438473"/>
+            <a:ext cx="1853961" cy="931169"/>
+          </a:xfrm>
+          <a:prstGeom prst="rect">
+            <a:avLst/>
+          </a:prstGeom>
+          <a:solidFill>
+            <a:schemeClr val="accent6">
+              <a:lumMod val="60000"/>
+              <a:lumOff val="40000"/>
+            </a:schemeClr>
+          </a:solidFill>
+          <a:ln>
+            <a:noFill/>
+          </a:ln>
+        </p:spPr>
+        <p:style>
+          <a:lnRef idx="2">
+            <a:schemeClr val="accent1">
+              <a:shade val="50000"/>
+            </a:schemeClr>
+          </a:lnRef>
+          <a:fillRef idx="1">
+            <a:schemeClr val="accent1"/>
+          </a:fillRef>
+          <a:effectRef idx="0">
+            <a:schemeClr val="accent1"/>
+          </a:effectRef>
+          <a:fontRef idx="minor">
+            <a:schemeClr val="lt1"/>
+          </a:fontRef>
+        </p:style>
+        <p:txBody>
+          <a:bodyPr rtlCol="0" anchor="ctr"/>
+          <a:lstStyle/>
+          <a:p>
+            <a:pPr algn="ctr"/>
+            <a:r>
+              <a:rPr lang="en-US" dirty="0">
+                <a:solidFill>
+                  <a:schemeClr val="tx1"/>
+                </a:solidFill>
+              </a:rPr>
+              <a:t>Clients</a:t>
+            </a:r>
+          </a:p>
+          <a:p>
+            <a:pPr algn="ctr"/>
+            <a:r>
+              <a:rPr lang="en-US" sz="1400" dirty="0">
+                <a:solidFill>
+                  <a:schemeClr val="tx1"/>
+                </a:solidFill>
+              </a:rPr>
+              <a:t>(Consumers)</a:t>
+            </a:r>
+          </a:p>
+        </p:txBody>
+      </p:sp>
+      <p:sp>
+        <p:nvSpPr>
+          <p:cNvPr id="12" name="TextBox 11">
+            <a:extLst>
+              <a:ext uri="{FF2B5EF4-FFF2-40B4-BE49-F238E27FC236}">
+                <a16:creationId xmlns:a16="http://schemas.microsoft.com/office/drawing/2014/main" id="{69CD86E9-C174-410D-946D-F18601288BCC}"/>
+              </a:ext>
+            </a:extLst>
+          </p:cNvPr>
+          <p:cNvSpPr txBox="1"/>
+          <p:nvPr/>
+        </p:nvSpPr>
+        <p:spPr>
+          <a:xfrm rot="10800000">
+            <a:off x="726826" y="1483564"/>
+            <a:ext cx="461665" cy="2840409"/>
+          </a:xfrm>
+          <a:prstGeom prst="rect">
+            <a:avLst/>
+          </a:prstGeom>
+          <a:noFill/>
+        </p:spPr>
+        <p:txBody>
+          <a:bodyPr vert="eaVert" wrap="square" rtlCol="0">
+            <a:spAutoFit/>
+          </a:bodyPr>
+          <a:lstStyle/>
+          <a:p>
+            <a:pPr algn="ctr"/>
+            <a:r>
+              <a:rPr lang="en-US" dirty="0"/>
+              <a:t>Business/Domain Spectrum</a:t>
+            </a:r>
+          </a:p>
+        </p:txBody>
+      </p:sp>
+      <p:sp>
+        <p:nvSpPr>
+          <p:cNvPr id="13" name="TextBox 12">
+            <a:extLst>
+              <a:ext uri="{FF2B5EF4-FFF2-40B4-BE49-F238E27FC236}">
+                <a16:creationId xmlns:a16="http://schemas.microsoft.com/office/drawing/2014/main" id="{067665E2-1485-463D-A351-5DB69373C7A9}"/>
+              </a:ext>
+            </a:extLst>
+          </p:cNvPr>
+          <p:cNvSpPr txBox="1"/>
+          <p:nvPr/>
+        </p:nvSpPr>
+        <p:spPr>
+          <a:xfrm>
+            <a:off x="2939143" y="6270173"/>
+            <a:ext cx="4460033" cy="369332"/>
+          </a:xfrm>
+          <a:prstGeom prst="rect">
+            <a:avLst/>
+          </a:prstGeom>
+          <a:noFill/>
+        </p:spPr>
+        <p:txBody>
+          <a:bodyPr wrap="square" rtlCol="0">
+            <a:spAutoFit/>
+          </a:bodyPr>
+          <a:lstStyle/>
+          <a:p>
+            <a:pPr algn="ctr"/>
+            <a:r>
+              <a:rPr lang="en-US" dirty="0"/>
+              <a:t>Decision Bind Time Spectrum</a:t>
+            </a:r>
+          </a:p>
+        </p:txBody>
+      </p:sp>
+      <p:sp>
+        <p:nvSpPr>
+          <p:cNvPr id="14" name="TextBox 13">
+            <a:extLst>
+              <a:ext uri="{FF2B5EF4-FFF2-40B4-BE49-F238E27FC236}">
+                <a16:creationId xmlns:a16="http://schemas.microsoft.com/office/drawing/2014/main" id="{0C5402C7-7C65-4E1F-8CF3-6799BF23C05E}"/>
+              </a:ext>
+            </a:extLst>
+          </p:cNvPr>
+          <p:cNvSpPr txBox="1"/>
+          <p:nvPr/>
+        </p:nvSpPr>
+        <p:spPr>
+          <a:xfrm>
+            <a:off x="1920530" y="5460859"/>
+            <a:ext cx="2191655" cy="369332"/>
+          </a:xfrm>
+          <a:prstGeom prst="rect">
+            <a:avLst/>
+          </a:prstGeom>
+          <a:noFill/>
+        </p:spPr>
+        <p:txBody>
+          <a:bodyPr wrap="square" rtlCol="0">
+            <a:spAutoFit/>
+          </a:bodyPr>
+          <a:lstStyle/>
+          <a:p>
+            <a:pPr algn="ctr"/>
+            <a:r>
+              <a:rPr lang="en-US" dirty="0"/>
+              <a:t>Domain Truths</a:t>
+            </a:r>
+          </a:p>
+        </p:txBody>
+      </p:sp>
+      <p:sp>
+        <p:nvSpPr>
+          <p:cNvPr id="16" name="TextBox 15">
+            <a:extLst>
+              <a:ext uri="{FF2B5EF4-FFF2-40B4-BE49-F238E27FC236}">
+                <a16:creationId xmlns:a16="http://schemas.microsoft.com/office/drawing/2014/main" id="{7D3BD3FE-8C50-4FE5-8577-189773BE4FB5}"/>
+              </a:ext>
+            </a:extLst>
+          </p:cNvPr>
+          <p:cNvSpPr txBox="1"/>
+          <p:nvPr/>
+        </p:nvSpPr>
+        <p:spPr>
+          <a:xfrm>
+            <a:off x="4307115" y="5453072"/>
+            <a:ext cx="2191655" cy="369332"/>
+          </a:xfrm>
+          <a:prstGeom prst="rect">
+            <a:avLst/>
+          </a:prstGeom>
+          <a:noFill/>
+        </p:spPr>
+        <p:txBody>
+          <a:bodyPr wrap="square" rtlCol="0">
+            <a:spAutoFit/>
+          </a:bodyPr>
+          <a:lstStyle/>
+          <a:p>
+            <a:pPr algn="ctr"/>
+            <a:r>
+              <a:rPr lang="en-US" dirty="0"/>
+              <a:t>Integration-time</a:t>
+            </a:r>
+          </a:p>
+        </p:txBody>
+      </p:sp>
+      <p:sp>
+        <p:nvSpPr>
+          <p:cNvPr id="18" name="TextBox 17">
+            <a:extLst>
+              <a:ext uri="{FF2B5EF4-FFF2-40B4-BE49-F238E27FC236}">
+                <a16:creationId xmlns:a16="http://schemas.microsoft.com/office/drawing/2014/main" id="{C0B18649-46B5-48C6-82F7-4179A54CF67D}"/>
+              </a:ext>
+            </a:extLst>
+          </p:cNvPr>
+          <p:cNvSpPr txBox="1"/>
+          <p:nvPr/>
+        </p:nvSpPr>
+        <p:spPr>
+          <a:xfrm>
+            <a:off x="6643096" y="5446091"/>
+            <a:ext cx="2191655" cy="369332"/>
+          </a:xfrm>
+          <a:prstGeom prst="rect">
+            <a:avLst/>
+          </a:prstGeom>
+          <a:noFill/>
+        </p:spPr>
+        <p:txBody>
+          <a:bodyPr wrap="square" rtlCol="0">
+            <a:spAutoFit/>
+          </a:bodyPr>
+          <a:lstStyle/>
+          <a:p>
+            <a:pPr algn="ctr"/>
+            <a:r>
+              <a:rPr lang="en-US" dirty="0"/>
+              <a:t>Deploy/Runtime</a:t>
+            </a:r>
+          </a:p>
+        </p:txBody>
+      </p:sp>
+      <p:sp>
+        <p:nvSpPr>
+          <p:cNvPr id="19" name="TextBox 18">
+            <a:extLst>
+              <a:ext uri="{FF2B5EF4-FFF2-40B4-BE49-F238E27FC236}">
+                <a16:creationId xmlns:a16="http://schemas.microsoft.com/office/drawing/2014/main" id="{3AA51C91-5C0A-4316-9BF2-EA5E6CCC7E0B}"/>
+              </a:ext>
+            </a:extLst>
+          </p:cNvPr>
+          <p:cNvSpPr txBox="1"/>
+          <p:nvPr/>
+        </p:nvSpPr>
+        <p:spPr>
+          <a:xfrm>
+            <a:off x="1408494" y="6270173"/>
+            <a:ext cx="1148093" cy="415498"/>
+          </a:xfrm>
+          <a:prstGeom prst="rect">
+            <a:avLst/>
+          </a:prstGeom>
+          <a:noFill/>
+        </p:spPr>
+        <p:txBody>
+          <a:bodyPr wrap="square" rtlCol="0">
+            <a:spAutoFit/>
+          </a:bodyPr>
+          <a:lstStyle/>
+          <a:p>
+            <a:r>
+              <a:rPr lang="en-US" sz="1050" dirty="0"/>
+              <a:t>General, Stable,</a:t>
+            </a:r>
+          </a:p>
+          <a:p>
+            <a:r>
+              <a:rPr lang="en-US" sz="1050" dirty="0"/>
+              <a:t>Strict Separation</a:t>
+            </a:r>
+          </a:p>
+        </p:txBody>
+      </p:sp>
+      <p:sp>
+        <p:nvSpPr>
+          <p:cNvPr id="21" name="TextBox 20">
+            <a:extLst>
+              <a:ext uri="{FF2B5EF4-FFF2-40B4-BE49-F238E27FC236}">
+                <a16:creationId xmlns:a16="http://schemas.microsoft.com/office/drawing/2014/main" id="{212A33A1-7E44-4D7B-8288-6EC4CE06D8F4}"/>
+              </a:ext>
+            </a:extLst>
+          </p:cNvPr>
+          <p:cNvSpPr txBox="1"/>
+          <p:nvPr/>
+        </p:nvSpPr>
+        <p:spPr>
+          <a:xfrm>
+            <a:off x="8260704" y="6270173"/>
+            <a:ext cx="1228529" cy="415498"/>
+          </a:xfrm>
+          <a:prstGeom prst="rect">
+            <a:avLst/>
+          </a:prstGeom>
+          <a:noFill/>
+        </p:spPr>
+        <p:txBody>
+          <a:bodyPr wrap="square" rtlCol="0">
+            <a:spAutoFit/>
+          </a:bodyPr>
+          <a:lstStyle/>
+          <a:p>
+            <a:r>
+              <a:rPr lang="en-US" sz="1050" dirty="0"/>
+              <a:t>Specific, Unstable,</a:t>
+            </a:r>
+          </a:p>
+          <a:p>
+            <a:r>
+              <a:rPr lang="en-US" sz="1050" dirty="0"/>
+              <a:t>Loose Separation</a:t>
+            </a:r>
+          </a:p>
+        </p:txBody>
+      </p:sp>
+      <p:sp>
+        <p:nvSpPr>
+          <p:cNvPr id="23" name="TextBox 22">
+            <a:extLst>
+              <a:ext uri="{FF2B5EF4-FFF2-40B4-BE49-F238E27FC236}">
+                <a16:creationId xmlns:a16="http://schemas.microsoft.com/office/drawing/2014/main" id="{A7DC223D-2AA7-4B7E-B2F7-CD0A0B35CED0}"/>
+              </a:ext>
+            </a:extLst>
+          </p:cNvPr>
+          <p:cNvSpPr txBox="1"/>
+          <p:nvPr/>
+        </p:nvSpPr>
+        <p:spPr>
+          <a:xfrm>
+            <a:off x="726826" y="316193"/>
+            <a:ext cx="668067" cy="415498"/>
+          </a:xfrm>
+          <a:prstGeom prst="rect">
+            <a:avLst/>
+          </a:prstGeom>
+          <a:noFill/>
+        </p:spPr>
+        <p:txBody>
+          <a:bodyPr wrap="square" rtlCol="0">
+            <a:spAutoFit/>
+          </a:bodyPr>
+          <a:lstStyle/>
+          <a:p>
+            <a:r>
+              <a:rPr lang="en-US" sz="1050" dirty="0"/>
+              <a:t>Specific</a:t>
+            </a:r>
+          </a:p>
+          <a:p>
+            <a:r>
+              <a:rPr lang="en-US" sz="1050" dirty="0"/>
+              <a:t>Unstable</a:t>
+            </a:r>
+          </a:p>
+        </p:txBody>
+      </p:sp>
+      <p:sp>
+        <p:nvSpPr>
+          <p:cNvPr id="24" name="TextBox 23">
+            <a:extLst>
+              <a:ext uri="{FF2B5EF4-FFF2-40B4-BE49-F238E27FC236}">
+                <a16:creationId xmlns:a16="http://schemas.microsoft.com/office/drawing/2014/main" id="{3995A5A1-F7F3-401F-B31F-F10F70C9A880}"/>
+              </a:ext>
+            </a:extLst>
+          </p:cNvPr>
+          <p:cNvSpPr txBox="1"/>
+          <p:nvPr/>
+        </p:nvSpPr>
+        <p:spPr>
+          <a:xfrm>
+            <a:off x="698858" y="5166687"/>
+            <a:ext cx="612171" cy="415498"/>
+          </a:xfrm>
+          <a:prstGeom prst="rect">
+            <a:avLst/>
+          </a:prstGeom>
+          <a:noFill/>
+        </p:spPr>
+        <p:txBody>
+          <a:bodyPr wrap="square" rtlCol="0">
+            <a:spAutoFit/>
+          </a:bodyPr>
+          <a:lstStyle/>
+          <a:p>
+            <a:r>
+              <a:rPr lang="en-US" sz="1050" dirty="0"/>
+              <a:t>General</a:t>
+            </a:r>
+          </a:p>
+          <a:p>
+            <a:r>
+              <a:rPr lang="en-US" sz="1050" dirty="0"/>
+              <a:t>Stable</a:t>
+            </a:r>
+          </a:p>
+        </p:txBody>
+      </p:sp>
+      <p:sp>
+        <p:nvSpPr>
+          <p:cNvPr id="26" name="Rectangle 25">
+            <a:extLst>
+              <a:ext uri="{FF2B5EF4-FFF2-40B4-BE49-F238E27FC236}">
+                <a16:creationId xmlns:a16="http://schemas.microsoft.com/office/drawing/2014/main" id="{08D2590A-735B-45F6-8DAC-F21756A51B86}"/>
+              </a:ext>
+            </a:extLst>
+          </p:cNvPr>
+          <p:cNvSpPr/>
+          <p:nvPr/>
+        </p:nvSpPr>
+        <p:spPr>
+          <a:xfrm>
+            <a:off x="4475961" y="3692381"/>
+            <a:ext cx="1853961" cy="931169"/>
+          </a:xfrm>
+          <a:prstGeom prst="rect">
+            <a:avLst/>
+          </a:prstGeom>
+          <a:solidFill>
+            <a:srgbClr val="DBA2DC"/>
+          </a:solidFill>
+          <a:ln>
+            <a:noFill/>
+          </a:ln>
+        </p:spPr>
+        <p:style>
+          <a:lnRef idx="2">
+            <a:schemeClr val="accent1">
+              <a:shade val="50000"/>
+            </a:schemeClr>
+          </a:lnRef>
+          <a:fillRef idx="1">
+            <a:schemeClr val="accent1"/>
+          </a:fillRef>
+          <a:effectRef idx="0">
+            <a:schemeClr val="accent1"/>
+          </a:effectRef>
+          <a:fontRef idx="minor">
+            <a:schemeClr val="lt1"/>
+          </a:fontRef>
+        </p:style>
+        <p:txBody>
+          <a:bodyPr rtlCol="0" anchor="ctr"/>
+          <a:lstStyle/>
+          <a:p>
+            <a:pPr algn="ctr"/>
+            <a:r>
+              <a:rPr lang="en-US" dirty="0">
+                <a:solidFill>
+                  <a:schemeClr val="tx1"/>
+                </a:solidFill>
+              </a:rPr>
+              <a:t>Utilities</a:t>
+            </a:r>
+          </a:p>
+        </p:txBody>
+      </p:sp>
     </p:spTree>
     <p:extLst>
       <p:ext uri="{BB962C8B-B14F-4D97-AF65-F5344CB8AC3E}">
         <p14:creationId xmlns:p14="http://schemas.microsoft.com/office/powerpoint/2010/main" val="861446425"/>
+      </p:ext>
+    </p:extLst>
+  </p:cSld>
+  <p:clrMapOvr>
+    <a:masterClrMapping/>
+  </p:clrMapOvr>
+</p:sld>
+</file>
+
+<file path=ppt/slides/slide2.xml><?xml version="1.0" encoding="utf-8"?>
+<p:sld xmlns:a="http://schemas.openxmlformats.org/drawingml/2006/main" xmlns:r="http://schemas.openxmlformats.org/officeDocument/2006/relationships" xmlns:p="http://schemas.openxmlformats.org/presentationml/2006/main">
+  <p:cSld>
+    <p:spTree>
+      <p:nvGrpSpPr>
+        <p:cNvPr id="1" name=""/>
+        <p:cNvGrpSpPr/>
+        <p:nvPr/>
+      </p:nvGrpSpPr>
+      <p:grpSpPr>
+        <a:xfrm>
+          <a:off x="0" y="0"/>
+          <a:ext cx="0" cy="0"/>
+          <a:chOff x="0" y="0"/>
+          <a:chExt cx="0" cy="0"/>
+        </a:xfrm>
+      </p:grpSpPr>
+      <p:sp>
+        <p:nvSpPr>
+          <p:cNvPr id="2" name="Title 1">
+            <a:extLst>
+              <a:ext uri="{FF2B5EF4-FFF2-40B4-BE49-F238E27FC236}">
+                <a16:creationId xmlns:a16="http://schemas.microsoft.com/office/drawing/2014/main" id="{404E788C-49B6-4720-861D-C43A088671C8}"/>
+              </a:ext>
+            </a:extLst>
+          </p:cNvPr>
+          <p:cNvSpPr>
+            <a:spLocks noGrp="1"/>
+          </p:cNvSpPr>
+          <p:nvPr>
+            <p:ph type="title"/>
+          </p:nvPr>
+        </p:nvSpPr>
+        <p:spPr/>
+        <p:txBody>
+          <a:bodyPr/>
+          <a:lstStyle/>
+          <a:p>
+            <a:endParaRPr lang="en-US"/>
+          </a:p>
+        </p:txBody>
+      </p:sp>
+      <p:sp>
+        <p:nvSpPr>
+          <p:cNvPr id="3" name="Vertical Text Placeholder 2">
+            <a:extLst>
+              <a:ext uri="{FF2B5EF4-FFF2-40B4-BE49-F238E27FC236}">
+                <a16:creationId xmlns:a16="http://schemas.microsoft.com/office/drawing/2014/main" id="{632C552D-668D-4231-B506-9A43F355608C}"/>
+              </a:ext>
+            </a:extLst>
+          </p:cNvPr>
+          <p:cNvSpPr>
+            <a:spLocks noGrp="1"/>
+          </p:cNvSpPr>
+          <p:nvPr>
+            <p:ph type="body" orient="vert" idx="1"/>
+          </p:nvPr>
+        </p:nvSpPr>
+        <p:spPr/>
+        <p:txBody>
+          <a:bodyPr vert="horz">
+            <a:normAutofit fontScale="70000" lnSpcReduction="20000"/>
+          </a:bodyPr>
+          <a:lstStyle/>
+          <a:p>
+            <a:r>
+              <a:rPr lang="en-US" dirty="0"/>
+              <a:t>Design time</a:t>
+            </a:r>
+          </a:p>
+          <a:p>
+            <a:pPr lvl="1"/>
+            <a:r>
+              <a:rPr lang="en-US" dirty="0"/>
+              <a:t>Encoding of the business domain</a:t>
+            </a:r>
+          </a:p>
+          <a:p>
+            <a:pPr lvl="2"/>
+            <a:r>
+              <a:rPr lang="en-US" dirty="0"/>
+              <a:t>Consumers</a:t>
+            </a:r>
+          </a:p>
+          <a:p>
+            <a:pPr lvl="2"/>
+            <a:r>
+              <a:rPr lang="en-US" dirty="0"/>
+              <a:t>Use cases</a:t>
+            </a:r>
+          </a:p>
+          <a:p>
+            <a:pPr lvl="2"/>
+            <a:r>
+              <a:rPr lang="en-US" dirty="0"/>
+              <a:t>Equivalent calculations (</a:t>
+            </a:r>
+            <a:r>
+              <a:rPr lang="en-US" dirty="0" err="1"/>
+              <a:t>i.e</a:t>
+            </a:r>
+            <a:r>
+              <a:rPr lang="en-US" dirty="0"/>
+              <a:t> taxes)</a:t>
+            </a:r>
+          </a:p>
+          <a:p>
+            <a:pPr lvl="2"/>
+            <a:r>
+              <a:rPr lang="en-US" dirty="0"/>
+              <a:t>Atomic actions</a:t>
+            </a:r>
+          </a:p>
+          <a:p>
+            <a:r>
+              <a:rPr lang="en-US" dirty="0"/>
+              <a:t>Integration-time decisions</a:t>
+            </a:r>
+          </a:p>
+          <a:p>
+            <a:pPr lvl="1"/>
+            <a:r>
+              <a:rPr lang="en-US" dirty="0"/>
+              <a:t>Framework-related scaling decisions (i.e. message bus, pre-built distributed identity platform, transactional mail, calling domain services remotely…)</a:t>
+            </a:r>
+          </a:p>
+          <a:p>
+            <a:pPr lvl="1"/>
+            <a:r>
+              <a:rPr lang="en-US" dirty="0"/>
+              <a:t>Framework-related flexibility concerns (business-editable emails, identity management accessible to business team, </a:t>
+            </a:r>
+            <a:r>
+              <a:rPr lang="en-US" dirty="0" err="1"/>
+              <a:t>etc</a:t>
+            </a:r>
+            <a:r>
+              <a:rPr lang="en-US" dirty="0"/>
+              <a:t>)</a:t>
+            </a:r>
+          </a:p>
+          <a:p>
+            <a:r>
+              <a:rPr lang="en-US" dirty="0"/>
+              <a:t>Runtime decisions</a:t>
+            </a:r>
+          </a:p>
+          <a:p>
+            <a:pPr lvl="1"/>
+            <a:r>
+              <a:rPr lang="en-US" dirty="0"/>
+              <a:t>Infrastructure and infrastructure-related scale</a:t>
+            </a:r>
+          </a:p>
+          <a:p>
+            <a:pPr lvl="1"/>
+            <a:r>
+              <a:rPr lang="en-US" dirty="0"/>
+              <a:t>Final mix of potential utility integrations  </a:t>
+            </a:r>
+          </a:p>
+          <a:p>
+            <a:pPr lvl="1"/>
+            <a:endParaRPr lang="en-US" dirty="0"/>
+          </a:p>
+          <a:p>
+            <a:r>
+              <a:rPr lang="en-US" dirty="0"/>
+              <a:t>Question: do accessor implementations belong in the adapter section and only accessor abstractions in the domain category?</a:t>
+            </a:r>
+          </a:p>
+        </p:txBody>
+      </p:sp>
+    </p:spTree>
+    <p:extLst>
+      <p:ext uri="{BB962C8B-B14F-4D97-AF65-F5344CB8AC3E}">
+        <p14:creationId xmlns:p14="http://schemas.microsoft.com/office/powerpoint/2010/main" val="2183261219"/>
       </p:ext>
     </p:extLst>
   </p:cSld>

</xml_diff>

<commit_message>
Add agressively limited entities to solid table
</commit_message>
<xml_diff>
--- a/_drafts/Solid Structure Table.pptx
+++ b/_drafts/Solid Structure Table.pptx
@@ -3342,14 +3342,14 @@
           <p:nvPr>
             <p:extLst>
               <p:ext uri="{D42A27DB-BD31-4B8C-83A1-F6EECF244321}">
-                <p14:modId xmlns:p14="http://schemas.microsoft.com/office/powerpoint/2010/main" val="2777564638"/>
+                <p14:modId xmlns:p14="http://schemas.microsoft.com/office/powerpoint/2010/main" val="1570748913"/>
               </p:ext>
             </p:extLst>
           </p:nvPr>
         </p:nvGraphicFramePr>
         <p:xfrm>
-          <a:off x="1848500" y="316193"/>
-          <a:ext cx="7130577" cy="5144666"/>
+          <a:off x="1848499" y="316193"/>
+          <a:ext cx="9413540" cy="5144666"/>
         </p:xfrm>
         <a:graphic>
           <a:graphicData uri="http://schemas.openxmlformats.org/drawingml/2006/table">
@@ -3358,21 +3358,28 @@
                 <a:tableStyleId>{5940675A-B579-460E-94D1-54222C63F5DA}</a:tableStyleId>
               </a:tblPr>
               <a:tblGrid>
-                <a:gridCol w="2376859">
+                <a:gridCol w="2353385">
+                  <a:extLst>
+                    <a:ext uri="{9D8B030D-6E8A-4147-A177-3AD203B41FA5}">
+                      <a16:colId xmlns:a16="http://schemas.microsoft.com/office/drawing/2014/main" val="1454963116"/>
+                    </a:ext>
+                  </a:extLst>
+                </a:gridCol>
+                <a:gridCol w="2353385">
                   <a:extLst>
                     <a:ext uri="{9D8B030D-6E8A-4147-A177-3AD203B41FA5}">
                       <a16:colId xmlns:a16="http://schemas.microsoft.com/office/drawing/2014/main" val="297471673"/>
                     </a:ext>
                   </a:extLst>
                 </a:gridCol>
-                <a:gridCol w="2376859">
+                <a:gridCol w="2353385">
                   <a:extLst>
                     <a:ext uri="{9D8B030D-6E8A-4147-A177-3AD203B41FA5}">
                       <a16:colId xmlns:a16="http://schemas.microsoft.com/office/drawing/2014/main" val="1561921124"/>
                     </a:ext>
                   </a:extLst>
                 </a:gridCol>
-                <a:gridCol w="2376859">
+                <a:gridCol w="2353385">
                   <a:extLst>
                     <a:ext uri="{9D8B030D-6E8A-4147-A177-3AD203B41FA5}">
                       <a16:colId xmlns:a16="http://schemas.microsoft.com/office/drawing/2014/main" val="3695193737"/>
@@ -3381,6 +3388,20 @@
                 </a:gridCol>
               </a:tblGrid>
               <a:tr h="1182572">
+                <a:tc rowSpan="4">
+                  <a:txBody>
+                    <a:bodyPr/>
+                    <a:lstStyle/>
+                    <a:p>
+                      <a:pPr algn="ctr"/>
+                      <a:r>
+                        <a:rPr lang="en-US" dirty="0"/>
+                        <a:t>Aggressively limited shared contracts and fundamental domain entities</a:t>
+                      </a:r>
+                    </a:p>
+                  </a:txBody>
+                  <a:tcPr marL="137160" marR="137160" marT="137160" marB="137160" vert="vert" anchor="ctr"/>
+                </a:tc>
                 <a:tc>
                   <a:txBody>
                     <a:bodyPr/>
@@ -3438,6 +3459,17 @@
                 </a:extLst>
               </a:tr>
               <a:tr h="1222310">
+                <a:tc vMerge="1">
+                  <a:txBody>
+                    <a:bodyPr/>
+                    <a:lstStyle/>
+                    <a:p>
+                      <a:pPr algn="ctr"/>
+                      <a:endParaRPr lang="en-US" dirty="0"/>
+                    </a:p>
+                  </a:txBody>
+                  <a:tcPr marL="137160" marR="137160" marT="137160" marB="137160" anchor="ctr"/>
+                </a:tc>
                 <a:tc>
                   <a:txBody>
                     <a:bodyPr/>
@@ -3507,6 +3539,17 @@
                 </a:extLst>
               </a:tr>
               <a:tr h="1333535">
+                <a:tc vMerge="1">
+                  <a:txBody>
+                    <a:bodyPr/>
+                    <a:lstStyle/>
+                    <a:p>
+                      <a:pPr algn="ctr"/>
+                      <a:endParaRPr lang="en-US" dirty="0"/>
+                    </a:p>
+                  </a:txBody>
+                  <a:tcPr marL="137160" marR="137160" marT="137160" marB="137160" anchor="ctr"/>
+                </a:tc>
                 <a:tc>
                   <a:txBody>
                     <a:bodyPr/>
@@ -3576,6 +3619,17 @@
                 </a:extLst>
               </a:tr>
               <a:tr h="1406249">
+                <a:tc vMerge="1">
+                  <a:txBody>
+                    <a:bodyPr/>
+                    <a:lstStyle/>
+                    <a:p>
+                      <a:pPr algn="ctr"/>
+                      <a:endParaRPr lang="en-US" dirty="0"/>
+                    </a:p>
+                  </a:txBody>
+                  <a:tcPr marL="137160" marR="137160" marT="137160" marB="137160" anchor="ctr"/>
+                </a:tc>
                 <a:tc>
                   <a:txBody>
                     <a:bodyPr/>
@@ -3731,7 +3785,7 @@
         </p:nvSpPr>
         <p:spPr>
           <a:xfrm>
-            <a:off x="2089379" y="4323973"/>
+            <a:off x="4440694" y="4323973"/>
             <a:ext cx="1853961" cy="931169"/>
           </a:xfrm>
           <a:prstGeom prst="rect">
@@ -3803,7 +3857,7 @@
         </p:nvSpPr>
         <p:spPr>
           <a:xfrm>
-            <a:off x="2089378" y="2926372"/>
+            <a:off x="4440693" y="2926372"/>
             <a:ext cx="1853961" cy="931169"/>
           </a:xfrm>
           <a:prstGeom prst="rect">
@@ -3873,7 +3927,7 @@
         </p:nvSpPr>
         <p:spPr>
           <a:xfrm>
-            <a:off x="2089378" y="1625871"/>
+            <a:off x="4440693" y="1625871"/>
             <a:ext cx="1853961" cy="931169"/>
           </a:xfrm>
           <a:prstGeom prst="rect">
@@ -3951,7 +4005,7 @@
         </p:nvSpPr>
         <p:spPr>
           <a:xfrm>
-            <a:off x="2089378" y="438473"/>
+            <a:off x="4440693" y="438473"/>
             <a:ext cx="1853961" cy="931169"/>
           </a:xfrm>
           <a:prstGeom prst="rect">
@@ -4368,7 +4422,7 @@
         </p:nvSpPr>
         <p:spPr>
           <a:xfrm>
-            <a:off x="4475961" y="3692381"/>
+            <a:off x="6827276" y="3692381"/>
             <a:ext cx="1853961" cy="931169"/>
           </a:xfrm>
           <a:prstGeom prst="rect">

</xml_diff>

<commit_message>
A strong first draft of refined solid structure explanation
</commit_message>
<xml_diff>
--- a/_drafts/Solid Structure Table.pptx
+++ b/_drafts/Solid Structure Table.pptx
@@ -3342,14 +3342,14 @@
           <p:nvPr>
             <p:extLst>
               <p:ext uri="{D42A27DB-BD31-4B8C-83A1-F6EECF244321}">
-                <p14:modId xmlns:p14="http://schemas.microsoft.com/office/powerpoint/2010/main" val="1570748913"/>
+                <p14:modId xmlns:p14="http://schemas.microsoft.com/office/powerpoint/2010/main" val="2204409879"/>
               </p:ext>
             </p:extLst>
           </p:nvPr>
         </p:nvGraphicFramePr>
         <p:xfrm>
-          <a:off x="1848499" y="316193"/>
-          <a:ext cx="9413540" cy="5144666"/>
+          <a:off x="1848501" y="316193"/>
+          <a:ext cx="6986250" cy="5144645"/>
         </p:xfrm>
         <a:graphic>
           <a:graphicData uri="http://schemas.openxmlformats.org/drawingml/2006/table">
@@ -3358,28 +3358,28 @@
                 <a:tableStyleId>{5940675A-B579-460E-94D1-54222C63F5DA}</a:tableStyleId>
               </a:tblPr>
               <a:tblGrid>
-                <a:gridCol w="2353385">
+                <a:gridCol w="740174">
                   <a:extLst>
                     <a:ext uri="{9D8B030D-6E8A-4147-A177-3AD203B41FA5}">
                       <a16:colId xmlns:a16="http://schemas.microsoft.com/office/drawing/2014/main" val="1454963116"/>
                     </a:ext>
                   </a:extLst>
                 </a:gridCol>
-                <a:gridCol w="2353385">
+                <a:gridCol w="2253913">
                   <a:extLst>
                     <a:ext uri="{9D8B030D-6E8A-4147-A177-3AD203B41FA5}">
                       <a16:colId xmlns:a16="http://schemas.microsoft.com/office/drawing/2014/main" val="297471673"/>
                     </a:ext>
                   </a:extLst>
                 </a:gridCol>
-                <a:gridCol w="2353385">
+                <a:gridCol w="2230016">
                   <a:extLst>
                     <a:ext uri="{9D8B030D-6E8A-4147-A177-3AD203B41FA5}">
                       <a16:colId xmlns:a16="http://schemas.microsoft.com/office/drawing/2014/main" val="1561921124"/>
                     </a:ext>
                   </a:extLst>
                 </a:gridCol>
-                <a:gridCol w="2353385">
+                <a:gridCol w="1762147">
                   <a:extLst>
                     <a:ext uri="{9D8B030D-6E8A-4147-A177-3AD203B41FA5}">
                       <a16:colId xmlns:a16="http://schemas.microsoft.com/office/drawing/2014/main" val="3695193737"/>
@@ -3387,7 +3387,7 @@
                   </a:extLst>
                 </a:gridCol>
               </a:tblGrid>
-              <a:tr h="1182572">
+              <a:tr h="1182567">
                 <a:tc rowSpan="4">
                   <a:txBody>
                     <a:bodyPr/>
@@ -3400,7 +3400,7 @@
                       </a:r>
                     </a:p>
                   </a:txBody>
-                  <a:tcPr marL="137160" marR="137160" marT="137160" marB="137160" vert="vert" anchor="ctr"/>
+                  <a:tcPr marL="137160" marR="137160" marT="137160" marB="137160" vert="vert270" anchor="ctr"/>
                 </a:tc>
                 <a:tc>
                   <a:txBody>
@@ -3458,7 +3458,7 @@
                   </a:ext>
                 </a:extLst>
               </a:tr>
-              <a:tr h="1222310">
+              <a:tr h="1222305">
                 <a:tc vMerge="1">
                   <a:txBody>
                     <a:bodyPr/>
@@ -3538,7 +3538,7 @@
                   </a:ext>
                 </a:extLst>
               </a:tr>
-              <a:tr h="1333535">
+              <a:tr h="1333530">
                 <a:tc vMerge="1">
                   <a:txBody>
                     <a:bodyPr/>
@@ -3618,7 +3618,7 @@
                   </a:ext>
                 </a:extLst>
               </a:tr>
-              <a:tr h="1406249">
+              <a:tr h="1406243">
                 <a:tc vMerge="1">
                   <a:txBody>
                     <a:bodyPr/>
@@ -3745,8 +3745,8 @@
         </p:nvCxnSpPr>
         <p:spPr>
           <a:xfrm flipH="1">
-            <a:off x="1848500" y="6169987"/>
-            <a:ext cx="7108887" cy="0"/>
+            <a:off x="1848501" y="5964710"/>
+            <a:ext cx="6986250" cy="0"/>
           </a:xfrm>
           <a:prstGeom prst="straightConnector1">
             <a:avLst/>
@@ -3785,7 +3785,7 @@
         </p:nvSpPr>
         <p:spPr>
           <a:xfrm>
-            <a:off x="4440694" y="4323973"/>
+            <a:off x="2800941" y="4323973"/>
             <a:ext cx="1853961" cy="931169"/>
           </a:xfrm>
           <a:prstGeom prst="rect">
@@ -3857,7 +3857,7 @@
         </p:nvSpPr>
         <p:spPr>
           <a:xfrm>
-            <a:off x="4440693" y="2926372"/>
+            <a:off x="2800940" y="2926372"/>
             <a:ext cx="1853961" cy="931169"/>
           </a:xfrm>
           <a:prstGeom prst="rect">
@@ -3927,7 +3927,7 @@
         </p:nvSpPr>
         <p:spPr>
           <a:xfrm>
-            <a:off x="4440693" y="1625871"/>
+            <a:off x="2800940" y="1625871"/>
             <a:ext cx="1853961" cy="931169"/>
           </a:xfrm>
           <a:prstGeom prst="rect">
@@ -4005,7 +4005,7 @@
         </p:nvSpPr>
         <p:spPr>
           <a:xfrm>
-            <a:off x="4440693" y="438473"/>
+            <a:off x="2800940" y="438473"/>
             <a:ext cx="1853961" cy="931169"/>
           </a:xfrm>
           <a:prstGeom prst="rect">
@@ -4114,7 +4114,7 @@
         </p:nvSpPr>
         <p:spPr>
           <a:xfrm>
-            <a:off x="2939143" y="6270173"/>
+            <a:off x="2939143" y="6064896"/>
             <a:ext cx="4460033" cy="369332"/>
           </a:xfrm>
           <a:prstGeom prst="rect">
@@ -4150,7 +4150,7 @@
         </p:nvSpPr>
         <p:spPr>
           <a:xfrm>
-            <a:off x="1920530" y="5460859"/>
+            <a:off x="2632092" y="5425317"/>
             <a:ext cx="2191655" cy="369332"/>
           </a:xfrm>
           <a:prstGeom prst="rect">
@@ -4186,7 +4186,7 @@
         </p:nvSpPr>
         <p:spPr>
           <a:xfrm>
-            <a:off x="4307115" y="5453072"/>
+            <a:off x="4865017" y="5425317"/>
             <a:ext cx="2191655" cy="369332"/>
           </a:xfrm>
           <a:prstGeom prst="rect">
@@ -4222,7 +4222,7 @@
         </p:nvSpPr>
         <p:spPr>
           <a:xfrm>
-            <a:off x="6643096" y="5446091"/>
+            <a:off x="6887826" y="5425317"/>
             <a:ext cx="2191655" cy="369332"/>
           </a:xfrm>
           <a:prstGeom prst="rect">
@@ -4258,7 +4258,7 @@
         </p:nvSpPr>
         <p:spPr>
           <a:xfrm>
-            <a:off x="1408494" y="6270173"/>
+            <a:off x="1408494" y="6064896"/>
             <a:ext cx="1148093" cy="415498"/>
           </a:xfrm>
           <a:prstGeom prst="rect">
@@ -4299,7 +4299,7 @@
         </p:nvSpPr>
         <p:spPr>
           <a:xfrm>
-            <a:off x="8260704" y="6270173"/>
+            <a:off x="8167398" y="6064896"/>
             <a:ext cx="1228529" cy="415498"/>
           </a:xfrm>
           <a:prstGeom prst="rect">
@@ -4422,7 +4422,7 @@
         </p:nvSpPr>
         <p:spPr>
           <a:xfrm>
-            <a:off x="6827276" y="3692381"/>
+            <a:off x="5033865" y="3694763"/>
             <a:ext cx="1853961" cy="931169"/>
           </a:xfrm>
           <a:prstGeom prst="rect">
@@ -4463,6 +4463,25 @@
                 </a:solidFill>
               </a:rPr>
               <a:t>Utilities</a:t>
+            </a:r>
+          </a:p>
+          <a:p>
+            <a:pPr algn="ctr"/>
+            <a:r>
+              <a:rPr lang="en-US" sz="1400">
+                <a:solidFill>
+                  <a:schemeClr val="tx1"/>
+                </a:solidFill>
+              </a:rPr>
+              <a:t>(External </a:t>
+            </a:r>
+            <a:r>
+              <a:rPr lang="en-US" sz="1400" dirty="0">
+                <a:solidFill>
+                  <a:schemeClr val="tx1"/>
+                </a:solidFill>
+              </a:rPr>
+              <a:t>domains)</a:t>
             </a:r>
           </a:p>
         </p:txBody>

</xml_diff>

<commit_message>
Start refactoring posts for the realization that I rediscovered clean arch
</commit_message>
<xml_diff>
--- a/_drafts/Solid Structure Table.pptx
+++ b/_drafts/Solid Structure Table.pptx
@@ -106,6 +106,16 @@
     </a:lvl9pPr>
   </p:defaultTextStyle>
   <p:extLst>
+    <p:ext uri="{521415D9-36F7-43E2-AB2F-B90AF26B5E84}">
+      <p14:sectionLst xmlns:p14="http://schemas.microsoft.com/office/powerpoint/2010/main">
+        <p14:section name="Untitled Section" id="{925171B5-49CD-4865-8C77-96988EBF73AA}">
+          <p14:sldIdLst>
+            <p14:sldId id="256"/>
+            <p14:sldId id="257"/>
+          </p14:sldIdLst>
+        </p14:section>
+      </p14:sectionLst>
+    </p:ext>
     <p:ext uri="{EFAFB233-063F-42B5-8137-9DF3F51BA10A}">
       <p15:sldGuideLst xmlns:p15="http://schemas.microsoft.com/office/powerpoint/2012/main"/>
     </p:ext>
@@ -260,7 +270,7 @@
           <a:p>
             <a:fld id="{C8935D48-1B7A-4328-8A92-3989B43617AB}" type="datetimeFigureOut">
               <a:rPr lang="en-US" smtClean="0"/>
-              <a:t>8/6/2020</a:t>
+              <a:t>8/8/2020</a:t>
             </a:fld>
             <a:endParaRPr lang="en-US"/>
           </a:p>
@@ -458,7 +468,7 @@
           <a:p>
             <a:fld id="{C8935D48-1B7A-4328-8A92-3989B43617AB}" type="datetimeFigureOut">
               <a:rPr lang="en-US" smtClean="0"/>
-              <a:t>8/6/2020</a:t>
+              <a:t>8/8/2020</a:t>
             </a:fld>
             <a:endParaRPr lang="en-US"/>
           </a:p>
@@ -666,7 +676,7 @@
           <a:p>
             <a:fld id="{C8935D48-1B7A-4328-8A92-3989B43617AB}" type="datetimeFigureOut">
               <a:rPr lang="en-US" smtClean="0"/>
-              <a:t>8/6/2020</a:t>
+              <a:t>8/8/2020</a:t>
             </a:fld>
             <a:endParaRPr lang="en-US"/>
           </a:p>
@@ -864,7 +874,7 @@
           <a:p>
             <a:fld id="{C8935D48-1B7A-4328-8A92-3989B43617AB}" type="datetimeFigureOut">
               <a:rPr lang="en-US" smtClean="0"/>
-              <a:t>8/6/2020</a:t>
+              <a:t>8/8/2020</a:t>
             </a:fld>
             <a:endParaRPr lang="en-US"/>
           </a:p>
@@ -1139,7 +1149,7 @@
           <a:p>
             <a:fld id="{C8935D48-1B7A-4328-8A92-3989B43617AB}" type="datetimeFigureOut">
               <a:rPr lang="en-US" smtClean="0"/>
-              <a:t>8/6/2020</a:t>
+              <a:t>8/8/2020</a:t>
             </a:fld>
             <a:endParaRPr lang="en-US"/>
           </a:p>
@@ -1404,7 +1414,7 @@
           <a:p>
             <a:fld id="{C8935D48-1B7A-4328-8A92-3989B43617AB}" type="datetimeFigureOut">
               <a:rPr lang="en-US" smtClean="0"/>
-              <a:t>8/6/2020</a:t>
+              <a:t>8/8/2020</a:t>
             </a:fld>
             <a:endParaRPr lang="en-US"/>
           </a:p>
@@ -1816,7 +1826,7 @@
           <a:p>
             <a:fld id="{C8935D48-1B7A-4328-8A92-3989B43617AB}" type="datetimeFigureOut">
               <a:rPr lang="en-US" smtClean="0"/>
-              <a:t>8/6/2020</a:t>
+              <a:t>8/8/2020</a:t>
             </a:fld>
             <a:endParaRPr lang="en-US"/>
           </a:p>
@@ -1957,7 +1967,7 @@
           <a:p>
             <a:fld id="{C8935D48-1B7A-4328-8A92-3989B43617AB}" type="datetimeFigureOut">
               <a:rPr lang="en-US" smtClean="0"/>
-              <a:t>8/6/2020</a:t>
+              <a:t>8/8/2020</a:t>
             </a:fld>
             <a:endParaRPr lang="en-US"/>
           </a:p>
@@ -2070,7 +2080,7 @@
           <a:p>
             <a:fld id="{C8935D48-1B7A-4328-8A92-3989B43617AB}" type="datetimeFigureOut">
               <a:rPr lang="en-US" smtClean="0"/>
-              <a:t>8/6/2020</a:t>
+              <a:t>8/8/2020</a:t>
             </a:fld>
             <a:endParaRPr lang="en-US"/>
           </a:p>
@@ -2381,7 +2391,7 @@
           <a:p>
             <a:fld id="{C8935D48-1B7A-4328-8A92-3989B43617AB}" type="datetimeFigureOut">
               <a:rPr lang="en-US" smtClean="0"/>
-              <a:t>8/6/2020</a:t>
+              <a:t>8/8/2020</a:t>
             </a:fld>
             <a:endParaRPr lang="en-US"/>
           </a:p>
@@ -2669,7 +2679,7 @@
           <a:p>
             <a:fld id="{C8935D48-1B7A-4328-8A92-3989B43617AB}" type="datetimeFigureOut">
               <a:rPr lang="en-US" smtClean="0"/>
-              <a:t>8/6/2020</a:t>
+              <a:t>8/8/2020</a:t>
             </a:fld>
             <a:endParaRPr lang="en-US"/>
           </a:p>
@@ -2910,7 +2920,7 @@
           <a:p>
             <a:fld id="{C8935D48-1B7A-4328-8A92-3989B43617AB}" type="datetimeFigureOut">
               <a:rPr lang="en-US" smtClean="0"/>
-              <a:t>8/6/2020</a:t>
+              <a:t>8/8/2020</a:t>
             </a:fld>
             <a:endParaRPr lang="en-US"/>
           </a:p>
@@ -3342,13 +3352,13 @@
           <p:nvPr>
             <p:extLst>
               <p:ext uri="{D42A27DB-BD31-4B8C-83A1-F6EECF244321}">
-                <p14:modId xmlns:p14="http://schemas.microsoft.com/office/powerpoint/2010/main" val="2204409879"/>
+                <p14:modId xmlns:p14="http://schemas.microsoft.com/office/powerpoint/2010/main" val="1326008588"/>
               </p:ext>
             </p:extLst>
           </p:nvPr>
         </p:nvGraphicFramePr>
         <p:xfrm>
-          <a:off x="1848501" y="316193"/>
+          <a:off x="1848501" y="500751"/>
           <a:ext cx="6986250" cy="5144645"/>
         </p:xfrm>
         <a:graphic>
@@ -3443,6 +3453,20 @@
                       <a:r>
                         <a:rPr lang="en-US" dirty="0"/>
                         <a:t>Clients</a:t>
+                      </a:r>
+                    </a:p>
+                    <a:p>
+                      <a:pPr algn="ctr"/>
+                      <a:r>
+                        <a:rPr lang="en-US" dirty="0"/>
+                        <a:t>Frameworks</a:t>
+                      </a:r>
+                    </a:p>
+                    <a:p>
+                      <a:pPr algn="ctr"/>
+                      <a:r>
+                        <a:rPr lang="en-US" dirty="0"/>
+                        <a:t>Infrastructure</a:t>
                       </a:r>
                     </a:p>
                     <a:p>
@@ -3703,7 +3727,7 @@
         </p:nvCxnSpPr>
         <p:spPr>
           <a:xfrm>
-            <a:off x="1408494" y="391886"/>
+            <a:off x="1408494" y="576444"/>
             <a:ext cx="0" cy="5068973"/>
           </a:xfrm>
           <a:prstGeom prst="straightConnector1">
@@ -3745,7 +3769,7 @@
         </p:nvCxnSpPr>
         <p:spPr>
           <a:xfrm flipH="1">
-            <a:off x="1848501" y="5964710"/>
+            <a:off x="1848501" y="5989877"/>
             <a:ext cx="6986250" cy="0"/>
           </a:xfrm>
           <a:prstGeom prst="straightConnector1">
@@ -3785,7 +3809,7 @@
         </p:nvSpPr>
         <p:spPr>
           <a:xfrm>
-            <a:off x="2800941" y="4323973"/>
+            <a:off x="2800941" y="4508531"/>
             <a:ext cx="1853961" cy="931169"/>
           </a:xfrm>
           <a:prstGeom prst="rect">
@@ -3857,7 +3881,7 @@
         </p:nvSpPr>
         <p:spPr>
           <a:xfrm>
-            <a:off x="2800940" y="2926372"/>
+            <a:off x="2800940" y="3110930"/>
             <a:ext cx="1853961" cy="931169"/>
           </a:xfrm>
           <a:prstGeom prst="rect">
@@ -3927,7 +3951,7 @@
         </p:nvSpPr>
         <p:spPr>
           <a:xfrm>
-            <a:off x="2800940" y="1625871"/>
+            <a:off x="2800940" y="1810429"/>
             <a:ext cx="1853961" cy="931169"/>
           </a:xfrm>
           <a:prstGeom prst="rect">
@@ -4005,7 +4029,7 @@
         </p:nvSpPr>
         <p:spPr>
           <a:xfrm>
-            <a:off x="2800940" y="438473"/>
+            <a:off x="2800940" y="623031"/>
             <a:ext cx="1853961" cy="931169"/>
           </a:xfrm>
           <a:prstGeom prst="rect">
@@ -4078,7 +4102,7 @@
         </p:nvSpPr>
         <p:spPr>
           <a:xfrm rot="10800000">
-            <a:off x="726826" y="1483564"/>
+            <a:off x="726826" y="1668122"/>
             <a:ext cx="461665" cy="2840409"/>
           </a:xfrm>
           <a:prstGeom prst="rect">
@@ -4114,7 +4138,7 @@
         </p:nvSpPr>
         <p:spPr>
           <a:xfrm>
-            <a:off x="2939143" y="6064896"/>
+            <a:off x="2939143" y="6090063"/>
             <a:ext cx="4460033" cy="369332"/>
           </a:xfrm>
           <a:prstGeom prst="rect">
@@ -4150,8 +4174,8 @@
         </p:nvSpPr>
         <p:spPr>
           <a:xfrm>
-            <a:off x="2632092" y="5425317"/>
-            <a:ext cx="2191655" cy="369332"/>
+            <a:off x="2632092" y="5644660"/>
+            <a:ext cx="2191655" cy="307777"/>
           </a:xfrm>
           <a:prstGeom prst="rect">
             <a:avLst/>
@@ -4166,9 +4190,10 @@
           <a:p>
             <a:pPr algn="ctr"/>
             <a:r>
-              <a:rPr lang="en-US" dirty="0"/>
+              <a:rPr lang="en-US" sz="1400" dirty="0"/>
               <a:t>Domain Truths</a:t>
             </a:r>
+            <a:endParaRPr lang="en-US" dirty="0"/>
           </a:p>
         </p:txBody>
       </p:sp>
@@ -4186,8 +4211,8 @@
         </p:nvSpPr>
         <p:spPr>
           <a:xfrm>
-            <a:off x="4865017" y="5425317"/>
-            <a:ext cx="2191655" cy="369332"/>
+            <a:off x="4823747" y="5646102"/>
+            <a:ext cx="2191655" cy="307777"/>
           </a:xfrm>
           <a:prstGeom prst="rect">
             <a:avLst/>
@@ -4202,9 +4227,10 @@
           <a:p>
             <a:pPr algn="ctr"/>
             <a:r>
-              <a:rPr lang="en-US" dirty="0"/>
+              <a:rPr lang="en-US" sz="1400"/>
               <a:t>Integration-time</a:t>
             </a:r>
+            <a:endParaRPr lang="en-US" dirty="0"/>
           </a:p>
         </p:txBody>
       </p:sp>
@@ -4222,8 +4248,8 @@
         </p:nvSpPr>
         <p:spPr>
           <a:xfrm>
-            <a:off x="6887826" y="5425317"/>
-            <a:ext cx="2191655" cy="369332"/>
+            <a:off x="6887826" y="5648166"/>
+            <a:ext cx="2191655" cy="307777"/>
           </a:xfrm>
           <a:prstGeom prst="rect">
             <a:avLst/>
@@ -4238,9 +4264,10 @@
           <a:p>
             <a:pPr algn="ctr"/>
             <a:r>
-              <a:rPr lang="en-US" dirty="0"/>
+              <a:rPr lang="en-US" sz="1400" dirty="0"/>
               <a:t>Deploy/Runtime</a:t>
             </a:r>
+            <a:endParaRPr lang="en-US" dirty="0"/>
           </a:p>
         </p:txBody>
       </p:sp>
@@ -4258,7 +4285,7 @@
         </p:nvSpPr>
         <p:spPr>
           <a:xfrm>
-            <a:off x="1408494" y="6064896"/>
+            <a:off x="1408494" y="6090063"/>
             <a:ext cx="1148093" cy="415498"/>
           </a:xfrm>
           <a:prstGeom prst="rect">
@@ -4299,7 +4326,7 @@
         </p:nvSpPr>
         <p:spPr>
           <a:xfrm>
-            <a:off x="8167398" y="6064896"/>
+            <a:off x="8167398" y="6090063"/>
             <a:ext cx="1228529" cy="415498"/>
           </a:xfrm>
           <a:prstGeom prst="rect">
@@ -4340,7 +4367,7 @@
         </p:nvSpPr>
         <p:spPr>
           <a:xfrm>
-            <a:off x="726826" y="316193"/>
+            <a:off x="726826" y="500751"/>
             <a:ext cx="668067" cy="415498"/>
           </a:xfrm>
           <a:prstGeom prst="rect">
@@ -4381,7 +4408,7 @@
         </p:nvSpPr>
         <p:spPr>
           <a:xfrm>
-            <a:off x="698858" y="5166687"/>
+            <a:off x="698858" y="5351245"/>
             <a:ext cx="612171" cy="415498"/>
           </a:xfrm>
           <a:prstGeom prst="rect">
@@ -4422,7 +4449,7 @@
         </p:nvSpPr>
         <p:spPr>
           <a:xfrm>
-            <a:off x="5033865" y="3694763"/>
+            <a:off x="5033865" y="3879321"/>
             <a:ext cx="1853961" cy="931169"/>
           </a:xfrm>
           <a:prstGeom prst="rect">
@@ -4483,6 +4510,153 @@
               </a:rPr>
               <a:t>domains)</a:t>
             </a:r>
+          </a:p>
+        </p:txBody>
+      </p:sp>
+      <p:sp>
+        <p:nvSpPr>
+          <p:cNvPr id="7" name="TextBox 6">
+            <a:extLst>
+              <a:ext uri="{FF2B5EF4-FFF2-40B4-BE49-F238E27FC236}">
+                <a16:creationId xmlns:a16="http://schemas.microsoft.com/office/drawing/2014/main" id="{B20A032E-474E-40D9-BBB4-9F6A6F305F18}"/>
+              </a:ext>
+            </a:extLst>
+          </p:cNvPr>
+          <p:cNvSpPr txBox="1"/>
+          <p:nvPr/>
+        </p:nvSpPr>
+        <p:spPr>
+          <a:xfrm>
+            <a:off x="2632092" y="91915"/>
+            <a:ext cx="2191655" cy="369332"/>
+          </a:xfrm>
+          <a:prstGeom prst="rect">
+            <a:avLst/>
+          </a:prstGeom>
+          <a:noFill/>
+        </p:spPr>
+        <p:txBody>
+          <a:bodyPr wrap="square" rtlCol="0">
+            <a:spAutoFit/>
+          </a:bodyPr>
+          <a:lstStyle/>
+          <a:p>
+            <a:pPr algn="ctr"/>
+            <a:r>
+              <a:rPr lang="en-US" dirty="0"/>
+              <a:t>App Business Rules</a:t>
+            </a:r>
+          </a:p>
+        </p:txBody>
+      </p:sp>
+      <p:sp>
+        <p:nvSpPr>
+          <p:cNvPr id="10" name="TextBox 9">
+            <a:extLst>
+              <a:ext uri="{FF2B5EF4-FFF2-40B4-BE49-F238E27FC236}">
+                <a16:creationId xmlns:a16="http://schemas.microsoft.com/office/drawing/2014/main" id="{1DEBBFD6-9AE6-4883-A5E2-E0ACE5601D53}"/>
+              </a:ext>
+            </a:extLst>
+          </p:cNvPr>
+          <p:cNvSpPr txBox="1"/>
+          <p:nvPr/>
+        </p:nvSpPr>
+        <p:spPr>
+          <a:xfrm>
+            <a:off x="1603771" y="-46585"/>
+            <a:ext cx="1148092" cy="646331"/>
+          </a:xfrm>
+          <a:prstGeom prst="rect">
+            <a:avLst/>
+          </a:prstGeom>
+          <a:noFill/>
+        </p:spPr>
+        <p:txBody>
+          <a:bodyPr wrap="square" rtlCol="0">
+            <a:spAutoFit/>
+          </a:bodyPr>
+          <a:lstStyle/>
+          <a:p>
+            <a:pPr algn="ctr"/>
+            <a:r>
+              <a:rPr lang="en-US" dirty="0"/>
+              <a:t>Enterprise Rules</a:t>
+            </a:r>
+            <a:endParaRPr lang="en-US" sz="2400" dirty="0"/>
+          </a:p>
+        </p:txBody>
+      </p:sp>
+      <p:sp>
+        <p:nvSpPr>
+          <p:cNvPr id="17" name="TextBox 16">
+            <a:extLst>
+              <a:ext uri="{FF2B5EF4-FFF2-40B4-BE49-F238E27FC236}">
+                <a16:creationId xmlns:a16="http://schemas.microsoft.com/office/drawing/2014/main" id="{EAF6CC3A-CDA0-41D1-909A-EE7F86EAEF52}"/>
+              </a:ext>
+            </a:extLst>
+          </p:cNvPr>
+          <p:cNvSpPr txBox="1"/>
+          <p:nvPr/>
+        </p:nvSpPr>
+        <p:spPr>
+          <a:xfrm>
+            <a:off x="4823746" y="93979"/>
+            <a:ext cx="2191655" cy="369332"/>
+          </a:xfrm>
+          <a:prstGeom prst="rect">
+            <a:avLst/>
+          </a:prstGeom>
+          <a:noFill/>
+        </p:spPr>
+        <p:txBody>
+          <a:bodyPr wrap="square" rtlCol="0">
+            <a:spAutoFit/>
+          </a:bodyPr>
+          <a:lstStyle/>
+          <a:p>
+            <a:pPr algn="ctr"/>
+            <a:r>
+              <a:rPr lang="en-US" dirty="0"/>
+              <a:t>Interface Adapters</a:t>
+            </a:r>
+            <a:endParaRPr lang="en-US" sz="2400" dirty="0"/>
+          </a:p>
+        </p:txBody>
+      </p:sp>
+      <p:sp>
+        <p:nvSpPr>
+          <p:cNvPr id="30" name="TextBox 29">
+            <a:extLst>
+              <a:ext uri="{FF2B5EF4-FFF2-40B4-BE49-F238E27FC236}">
+                <a16:creationId xmlns:a16="http://schemas.microsoft.com/office/drawing/2014/main" id="{693A6415-E9CA-47FD-8F6B-232ECEBF8C92}"/>
+              </a:ext>
+            </a:extLst>
+          </p:cNvPr>
+          <p:cNvSpPr txBox="1"/>
+          <p:nvPr/>
+        </p:nvSpPr>
+        <p:spPr>
+          <a:xfrm>
+            <a:off x="6887825" y="94927"/>
+            <a:ext cx="2191655" cy="369332"/>
+          </a:xfrm>
+          <a:prstGeom prst="rect">
+            <a:avLst/>
+          </a:prstGeom>
+          <a:noFill/>
+        </p:spPr>
+        <p:txBody>
+          <a:bodyPr wrap="square" rtlCol="0">
+            <a:spAutoFit/>
+          </a:bodyPr>
+          <a:lstStyle/>
+          <a:p>
+            <a:pPr algn="ctr"/>
+            <a:r>
+              <a:rPr lang="en-US" dirty="0"/>
+              <a:t>“Mechanisms”</a:t>
+            </a:r>
+            <a:endParaRPr lang="en-US" sz="2400" dirty="0"/>
           </a:p>
         </p:txBody>
       </p:sp>

</xml_diff>

<commit_message>
Further updates to solid structure table
</commit_message>
<xml_diff>
--- a/_drafts/Solid Structure Table.pptx
+++ b/_drafts/Solid Structure Table.pptx
@@ -3352,14 +3352,14 @@
           <p:nvPr>
             <p:extLst>
               <p:ext uri="{D42A27DB-BD31-4B8C-83A1-F6EECF244321}">
-                <p14:modId xmlns:p14="http://schemas.microsoft.com/office/powerpoint/2010/main" val="1326008588"/>
+                <p14:modId xmlns:p14="http://schemas.microsoft.com/office/powerpoint/2010/main" val="3537753702"/>
               </p:ext>
             </p:extLst>
           </p:nvPr>
         </p:nvGraphicFramePr>
         <p:xfrm>
           <a:off x="1848501" y="500751"/>
-          <a:ext cx="6986250" cy="5144645"/>
+          <a:ext cx="7219998" cy="5139755"/>
         </p:xfrm>
         <a:graphic>
           <a:graphicData uri="http://schemas.openxmlformats.org/drawingml/2006/table">
@@ -3389,7 +3389,7 @@
                     </a:ext>
                   </a:extLst>
                 </a:gridCol>
-                <a:gridCol w="1762147">
+                <a:gridCol w="1995895">
                   <a:extLst>
                     <a:ext uri="{9D8B030D-6E8A-4147-A177-3AD203B41FA5}">
                       <a16:colId xmlns:a16="http://schemas.microsoft.com/office/drawing/2014/main" val="3695193737"/>
@@ -3398,7 +3398,7 @@
                 </a:gridCol>
               </a:tblGrid>
               <a:tr h="1182567">
-                <a:tc rowSpan="4">
+                <a:tc rowSpan="5">
                   <a:txBody>
                     <a:bodyPr/>
                     <a:lstStyle/>
@@ -3444,7 +3444,7 @@
                     </a:lnB>
                   </a:tcPr>
                 </a:tc>
-                <a:tc rowSpan="4">
+                <a:tc rowSpan="3">
                   <a:txBody>
                     <a:bodyPr/>
                     <a:lstStyle/>
@@ -3452,29 +3452,23 @@
                       <a:pPr algn="ctr"/>
                       <a:r>
                         <a:rPr lang="en-US" dirty="0"/>
-                        <a:t>Clients</a:t>
-                      </a:r>
-                    </a:p>
-                    <a:p>
-                      <a:pPr algn="ctr"/>
-                      <a:r>
-                        <a:rPr lang="en-US" dirty="0"/>
-                        <a:t>Frameworks</a:t>
-                      </a:r>
-                    </a:p>
-                    <a:p>
-                      <a:pPr algn="ctr"/>
-                      <a:r>
-                        <a:rPr lang="en-US" dirty="0"/>
-                        <a:t>Infrastructure</a:t>
+                        <a:t>Your Code</a:t>
                       </a:r>
                     </a:p>
                     <a:p>
                       <a:pPr algn="ctr"/>
                       <a:endParaRPr lang="en-US" dirty="0"/>
                     </a:p>
+                    <a:p>
+                      <a:pPr algn="ctr"/>
+                      <a:endParaRPr lang="en-US" dirty="0"/>
+                    </a:p>
+                    <a:p>
+                      <a:pPr algn="ctr"/>
+                      <a:endParaRPr lang="en-US" dirty="0"/>
+                    </a:p>
                   </a:txBody>
-                  <a:tcPr marL="137160" marR="137160" marT="137160" marB="137160" anchor="ctr"/>
+                  <a:tcPr marL="137160" marR="137160" marT="137160" marB="137160"/>
                 </a:tc>
                 <a:extLst>
                   <a:ext uri="{0D108BD9-81ED-4DB2-BD59-A6C34878D82A}">
@@ -3562,7 +3556,7 @@
                   </a:ext>
                 </a:extLst>
               </a:tr>
-              <a:tr h="1333530">
+              <a:tr h="0">
                 <a:tc vMerge="1">
                   <a:txBody>
                     <a:bodyPr/>
@@ -3574,7 +3568,7 @@
                   </a:txBody>
                   <a:tcPr marL="137160" marR="137160" marT="137160" marB="137160" anchor="ctr"/>
                 </a:tc>
-                <a:tc>
+                <a:tc rowSpan="2">
                   <a:txBody>
                     <a:bodyPr/>
                     <a:lstStyle/>
@@ -3585,7 +3579,7 @@
                   </a:txBody>
                   <a:tcPr marL="137160" marR="137160" marT="137160" marB="137160" anchor="ctr"/>
                 </a:tc>
-                <a:tc>
+                <a:tc rowSpan="2">
                   <a:txBody>
                     <a:bodyPr/>
                     <a:lstStyle/>
@@ -3639,6 +3633,83 @@
                 <a:extLst>
                   <a:ext uri="{0D108BD9-81ED-4DB2-BD59-A6C34878D82A}">
                     <a16:rowId xmlns:a16="http://schemas.microsoft.com/office/drawing/2014/main" val="4044783207"/>
+                  </a:ext>
+                </a:extLst>
+              </a:tr>
+              <a:tr h="1166080">
+                <a:tc vMerge="1">
+                  <a:txBody>
+                    <a:bodyPr/>
+                    <a:lstStyle/>
+                    <a:p>
+                      <a:endParaRPr lang="en-US"/>
+                    </a:p>
+                  </a:txBody>
+                  <a:tcPr/>
+                </a:tc>
+                <a:tc vMerge="1">
+                  <a:txBody>
+                    <a:bodyPr/>
+                    <a:lstStyle/>
+                    <a:p>
+                      <a:endParaRPr lang="en-US"/>
+                    </a:p>
+                  </a:txBody>
+                  <a:tcPr/>
+                </a:tc>
+                <a:tc vMerge="1">
+                  <a:txBody>
+                    <a:bodyPr/>
+                    <a:lstStyle/>
+                    <a:p>
+                      <a:endParaRPr lang="en-US"/>
+                    </a:p>
+                  </a:txBody>
+                  <a:tcPr/>
+                </a:tc>
+                <a:tc rowSpan="2">
+                  <a:txBody>
+                    <a:bodyPr/>
+                    <a:lstStyle/>
+                    <a:p>
+                      <a:pPr algn="ctr"/>
+                      <a:r>
+                        <a:rPr lang="en-US" dirty="0"/>
+                        <a:t>External Code</a:t>
+                      </a:r>
+                    </a:p>
+                    <a:p>
+                      <a:pPr algn="ctr"/>
+                      <a:endParaRPr lang="en-US" dirty="0"/>
+                    </a:p>
+                    <a:p>
+                      <a:pPr algn="ctr"/>
+                      <a:r>
+                        <a:rPr lang="en-US" sz="1600" dirty="0"/>
+                        <a:t>Frameworks</a:t>
+                      </a:r>
+                    </a:p>
+                    <a:p>
+                      <a:pPr algn="ctr"/>
+                      <a:r>
+                        <a:rPr lang="en-US" sz="1600" dirty="0"/>
+                        <a:t>Infrastructure</a:t>
+                      </a:r>
+                    </a:p>
+                    <a:p>
+                      <a:pPr algn="ctr"/>
+                      <a:endParaRPr lang="en-US" dirty="0"/>
+                    </a:p>
+                    <a:p>
+                      <a:pPr algn="ctr"/>
+                      <a:endParaRPr lang="en-US" dirty="0"/>
+                    </a:p>
+                  </a:txBody>
+                  <a:tcPr marL="137160" marR="137160" marT="137160" marB="137160"/>
+                </a:tc>
+                <a:extLst>
+                  <a:ext uri="{0D108BD9-81ED-4DB2-BD59-A6C34878D82A}">
+                    <a16:rowId xmlns:a16="http://schemas.microsoft.com/office/drawing/2014/main" val="2122513008"/>
                   </a:ext>
                 </a:extLst>
               </a:tr>
@@ -4449,7 +4520,7 @@
         </p:nvSpPr>
         <p:spPr>
           <a:xfrm>
-            <a:off x="5033865" y="3879321"/>
+            <a:off x="7155815" y="2030298"/>
             <a:ext cx="1853961" cy="931169"/>
           </a:xfrm>
           <a:prstGeom prst="rect">
@@ -4495,20 +4566,12 @@
           <a:p>
             <a:pPr algn="ctr"/>
             <a:r>
-              <a:rPr lang="en-US" sz="1400">
-                <a:solidFill>
-                  <a:schemeClr val="tx1"/>
-                </a:solidFill>
-              </a:rPr>
-              <a:t>(External </a:t>
-            </a:r>
-            <a:r>
               <a:rPr lang="en-US" sz="1400" dirty="0">
                 <a:solidFill>
                   <a:schemeClr val="tx1"/>
                 </a:solidFill>
               </a:rPr>
-              <a:t>domains)</a:t>
+              <a:t>(External domains)</a:t>
             </a:r>
           </a:p>
         </p:txBody>
@@ -4657,6 +4720,149 @@
               <a:t>“Mechanisms”</a:t>
             </a:r>
             <a:endParaRPr lang="en-US" sz="2400" dirty="0"/>
+          </a:p>
+        </p:txBody>
+      </p:sp>
+      <p:sp>
+        <p:nvSpPr>
+          <p:cNvPr id="32" name="Rectangle 31">
+            <a:extLst>
+              <a:ext uri="{FF2B5EF4-FFF2-40B4-BE49-F238E27FC236}">
+                <a16:creationId xmlns:a16="http://schemas.microsoft.com/office/drawing/2014/main" id="{E4CB0373-0D4D-4F4B-93DA-3078D0A5B67E}"/>
+              </a:ext>
+            </a:extLst>
+          </p:cNvPr>
+          <p:cNvSpPr/>
+          <p:nvPr/>
+        </p:nvSpPr>
+        <p:spPr>
+          <a:xfrm>
+            <a:off x="7155815" y="1032069"/>
+            <a:ext cx="1853961" cy="931169"/>
+          </a:xfrm>
+          <a:prstGeom prst="rect">
+            <a:avLst/>
+          </a:prstGeom>
+          <a:solidFill>
+            <a:schemeClr val="accent6">
+              <a:lumMod val="60000"/>
+              <a:lumOff val="40000"/>
+            </a:schemeClr>
+          </a:solidFill>
+          <a:ln>
+            <a:noFill/>
+          </a:ln>
+        </p:spPr>
+        <p:style>
+          <a:lnRef idx="2">
+            <a:schemeClr val="accent1">
+              <a:shade val="50000"/>
+            </a:schemeClr>
+          </a:lnRef>
+          <a:fillRef idx="1">
+            <a:schemeClr val="accent1"/>
+          </a:fillRef>
+          <a:effectRef idx="0">
+            <a:schemeClr val="accent1"/>
+          </a:effectRef>
+          <a:fontRef idx="minor">
+            <a:schemeClr val="lt1"/>
+          </a:fontRef>
+        </p:style>
+        <p:txBody>
+          <a:bodyPr rtlCol="0" anchor="ctr"/>
+          <a:lstStyle/>
+          <a:p>
+            <a:pPr algn="ctr"/>
+            <a:r>
+              <a:rPr lang="en-US" dirty="0">
+                <a:solidFill>
+                  <a:schemeClr val="tx1"/>
+                </a:solidFill>
+              </a:rPr>
+              <a:t>Clients</a:t>
+            </a:r>
+          </a:p>
+          <a:p>
+            <a:pPr algn="ctr"/>
+            <a:r>
+              <a:rPr lang="en-US" sz="1400" dirty="0">
+                <a:solidFill>
+                  <a:schemeClr val="tx1"/>
+                </a:solidFill>
+              </a:rPr>
+              <a:t>(Consumers)</a:t>
+            </a:r>
+          </a:p>
+        </p:txBody>
+      </p:sp>
+      <p:sp>
+        <p:nvSpPr>
+          <p:cNvPr id="34" name="Rectangle 33">
+            <a:extLst>
+              <a:ext uri="{FF2B5EF4-FFF2-40B4-BE49-F238E27FC236}">
+                <a16:creationId xmlns:a16="http://schemas.microsoft.com/office/drawing/2014/main" id="{B274D0A8-DE1E-47FD-9E5C-C49804E22A1D}"/>
+              </a:ext>
+            </a:extLst>
+          </p:cNvPr>
+          <p:cNvSpPr/>
+          <p:nvPr/>
+        </p:nvSpPr>
+        <p:spPr>
+          <a:xfrm>
+            <a:off x="7155815" y="4487006"/>
+            <a:ext cx="1853961" cy="931169"/>
+          </a:xfrm>
+          <a:prstGeom prst="rect">
+            <a:avLst/>
+          </a:prstGeom>
+          <a:solidFill>
+            <a:srgbClr val="DBA2DC"/>
+          </a:solidFill>
+          <a:ln>
+            <a:noFill/>
+          </a:ln>
+        </p:spPr>
+        <p:style>
+          <a:lnRef idx="2">
+            <a:schemeClr val="accent1">
+              <a:shade val="50000"/>
+            </a:schemeClr>
+          </a:lnRef>
+          <a:fillRef idx="1">
+            <a:schemeClr val="accent1"/>
+          </a:fillRef>
+          <a:effectRef idx="0">
+            <a:schemeClr val="accent1"/>
+          </a:effectRef>
+          <a:fontRef idx="minor">
+            <a:schemeClr val="lt1"/>
+          </a:fontRef>
+        </p:style>
+        <p:txBody>
+          <a:bodyPr rtlCol="0" anchor="ctr"/>
+          <a:lstStyle/>
+          <a:p>
+            <a:pPr algn="ctr"/>
+            <a:r>
+              <a:rPr lang="en-US" dirty="0">
+                <a:solidFill>
+                  <a:schemeClr val="tx1"/>
+                </a:solidFill>
+              </a:rPr>
+              <a:t>Utilities</a:t>
+            </a:r>
+          </a:p>
+          <a:p>
+            <a:pPr algn="ctr"/>
+            <a:r>
+              <a:rPr lang="en-US" sz="1400" dirty="0">
+                <a:solidFill>
+                  <a:schemeClr val="tx1"/>
+                </a:solidFill>
+              </a:rPr>
+              <a:t>(External domains)</a:t>
+            </a:r>
           </a:p>
         </p:txBody>
       </p:sp>

</xml_diff>

<commit_message>
Remove clients from domain truths column
</commit_message>
<xml_diff>
--- a/_drafts/Solid Structure Table.pptx
+++ b/_drafts/Solid Structure Table.pptx
@@ -3352,14 +3352,14 @@
           <p:nvPr>
             <p:extLst>
               <p:ext uri="{D42A27DB-BD31-4B8C-83A1-F6EECF244321}">
-                <p14:modId xmlns:p14="http://schemas.microsoft.com/office/powerpoint/2010/main" val="3537753702"/>
+                <p14:modId xmlns:p14="http://schemas.microsoft.com/office/powerpoint/2010/main" val="506661680"/>
               </p:ext>
             </p:extLst>
           </p:nvPr>
         </p:nvGraphicFramePr>
         <p:xfrm>
-          <a:off x="1848501" y="500751"/>
-          <a:ext cx="7219998" cy="5139755"/>
+          <a:off x="1848501" y="1169715"/>
+          <a:ext cx="7219998" cy="4232796"/>
         </p:xfrm>
         <a:graphic>
           <a:graphicData uri="http://schemas.openxmlformats.org/drawingml/2006/table">
@@ -3397,8 +3397,8 @@
                   </a:extLst>
                 </a:gridCol>
               </a:tblGrid>
-              <a:tr h="1182567">
-                <a:tc rowSpan="5">
+              <a:tr h="1362896">
+                <a:tc rowSpan="4">
                   <a:txBody>
                     <a:bodyPr/>
                     <a:lstStyle/>
@@ -3429,82 +3429,6 @@
                     <a:lstStyle/>
                     <a:p>
                       <a:pPr algn="ctr"/>
-                      <a:endParaRPr lang="en-US" dirty="0"/>
-                    </a:p>
-                  </a:txBody>
-                  <a:tcPr marL="137160" marR="137160" marT="137160" marB="137160" anchor="ctr">
-                    <a:lnB w="12700" cap="flat" cmpd="sng" algn="ctr">
-                      <a:solidFill>
-                        <a:schemeClr val="tx1"/>
-                      </a:solidFill>
-                      <a:prstDash val="dash"/>
-                      <a:round/>
-                      <a:headEnd type="none" w="med" len="med"/>
-                      <a:tailEnd type="none" w="med" len="med"/>
-                    </a:lnB>
-                  </a:tcPr>
-                </a:tc>
-                <a:tc rowSpan="3">
-                  <a:txBody>
-                    <a:bodyPr/>
-                    <a:lstStyle/>
-                    <a:p>
-                      <a:pPr algn="ctr"/>
-                      <a:r>
-                        <a:rPr lang="en-US" dirty="0"/>
-                        <a:t>Your Code</a:t>
-                      </a:r>
-                    </a:p>
-                    <a:p>
-                      <a:pPr algn="ctr"/>
-                      <a:endParaRPr lang="en-US" dirty="0"/>
-                    </a:p>
-                    <a:p>
-                      <a:pPr algn="ctr"/>
-                      <a:endParaRPr lang="en-US" dirty="0"/>
-                    </a:p>
-                    <a:p>
-                      <a:pPr algn="ctr"/>
-                      <a:endParaRPr lang="en-US" dirty="0"/>
-                    </a:p>
-                  </a:txBody>
-                  <a:tcPr marL="137160" marR="137160" marT="137160" marB="137160"/>
-                </a:tc>
-                <a:extLst>
-                  <a:ext uri="{0D108BD9-81ED-4DB2-BD59-A6C34878D82A}">
-                    <a16:rowId xmlns:a16="http://schemas.microsoft.com/office/drawing/2014/main" val="3517474822"/>
-                  </a:ext>
-                </a:extLst>
-              </a:tr>
-              <a:tr h="1222305">
-                <a:tc vMerge="1">
-                  <a:txBody>
-                    <a:bodyPr/>
-                    <a:lstStyle/>
-                    <a:p>
-                      <a:pPr algn="ctr"/>
-                      <a:endParaRPr lang="en-US" dirty="0"/>
-                    </a:p>
-                  </a:txBody>
-                  <a:tcPr marL="137160" marR="137160" marT="137160" marB="137160" anchor="ctr"/>
-                </a:tc>
-                <a:tc>
-                  <a:txBody>
-                    <a:bodyPr/>
-                    <a:lstStyle/>
-                    <a:p>
-                      <a:pPr algn="ctr"/>
-                      <a:endParaRPr lang="en-US" dirty="0"/>
-                    </a:p>
-                  </a:txBody>
-                  <a:tcPr marL="137160" marR="137160" marT="137160" marB="137160" anchor="ctr"/>
-                </a:tc>
-                <a:tc>
-                  <a:txBody>
-                    <a:bodyPr/>
-                    <a:lstStyle/>
-                    <a:p>
-                      <a:pPr algn="ctr"/>
                       <a:r>
                         <a:rPr lang="en-US" dirty="0"/>
                         <a:t>Manager Adapters</a:t>
@@ -3516,7 +3440,7 @@
                       <a:solidFill>
                         <a:schemeClr val="tx1"/>
                       </a:solidFill>
-                      <a:prstDash val="dash"/>
+                      <a:prstDash val="solid"/>
                       <a:round/>
                       <a:headEnd type="none" w="med" len="med"/>
                       <a:tailEnd type="none" w="med" len="med"/>
@@ -3532,19 +3456,19 @@
                     </a:lnB>
                   </a:tcPr>
                 </a:tc>
-                <a:tc vMerge="1">
+                <a:tc rowSpan="2">
                   <a:txBody>
                     <a:bodyPr/>
                     <a:lstStyle/>
                     <a:p>
                       <a:pPr algn="ctr"/>
-                      <a:endParaRPr lang="en-US" dirty="0"/>
+                      <a:r>
+                        <a:rPr lang="en-US" dirty="0"/>
+                        <a:t>Your Code</a:t>
+                      </a:r>
                     </a:p>
                   </a:txBody>
-                  <a:tcPr marL="137160" marR="137160" marT="137160" marB="137160" anchor="ctr">
-                    <a:lnT w="12700" cmpd="sng">
-                      <a:noFill/>
-                    </a:lnT>
+                  <a:tcPr marL="137160" marR="137160" marT="137160" marB="137160">
                     <a:lnB w="12700" cmpd="sng">
                       <a:noFill/>
                     </a:lnB>
@@ -3556,7 +3480,7 @@
                   </a:ext>
                 </a:extLst>
               </a:tr>
-              <a:tr h="0">
+              <a:tr h="848153">
                 <a:tc vMerge="1">
                   <a:txBody>
                     <a:bodyPr/>
@@ -3636,7 +3560,7 @@
                   </a:ext>
                 </a:extLst>
               </a:tr>
-              <a:tr h="1166080">
+              <a:tr h="662730">
                 <a:tc vMerge="1">
                   <a:txBody>
                     <a:bodyPr/>
@@ -3675,26 +3599,12 @@
                       <a:pPr algn="ctr"/>
                       <a:r>
                         <a:rPr lang="en-US" dirty="0"/>
-                        <a:t>External Code</a:t>
+                        <a:t>External</a:t>
                       </a:r>
                     </a:p>
                     <a:p>
                       <a:pPr algn="ctr"/>
                       <a:endParaRPr lang="en-US" dirty="0"/>
-                    </a:p>
-                    <a:p>
-                      <a:pPr algn="ctr"/>
-                      <a:r>
-                        <a:rPr lang="en-US" sz="1600" dirty="0"/>
-                        <a:t>Frameworks</a:t>
-                      </a:r>
-                    </a:p>
-                    <a:p>
-                      <a:pPr algn="ctr"/>
-                      <a:r>
-                        <a:rPr lang="en-US" sz="1600" dirty="0"/>
-                        <a:t>Infrastructure</a:t>
-                      </a:r>
                     </a:p>
                     <a:p>
                       <a:pPr algn="ctr"/>
@@ -3713,7 +3623,7 @@
                   </a:ext>
                 </a:extLst>
               </a:tr>
-              <a:tr h="1406243">
+              <a:tr h="1359017">
                 <a:tc vMerge="1">
                   <a:txBody>
                     <a:bodyPr/>
@@ -3766,11 +3676,7 @@
                       <a:endParaRPr lang="en-US" dirty="0"/>
                     </a:p>
                   </a:txBody>
-                  <a:tcPr marL="137160" marR="137160" marT="137160" marB="137160" anchor="ctr">
-                    <a:lnT w="12700" cmpd="sng">
-                      <a:noFill/>
-                    </a:lnT>
-                  </a:tcPr>
+                  <a:tcPr marL="137160" marR="137160" marT="137160" marB="137160" anchor="ctr"/>
                 </a:tc>
                 <a:extLst>
                   <a:ext uri="{0D108BD9-81ED-4DB2-BD59-A6C34878D82A}">
@@ -3798,8 +3704,8 @@
         </p:nvCxnSpPr>
         <p:spPr>
           <a:xfrm>
-            <a:off x="1408494" y="576444"/>
-            <a:ext cx="0" cy="5068973"/>
+            <a:off x="1408494" y="1178284"/>
+            <a:ext cx="0" cy="4224227"/>
           </a:xfrm>
           <a:prstGeom prst="straightConnector1">
             <a:avLst/>
@@ -3840,8 +3746,8 @@
         </p:nvCxnSpPr>
         <p:spPr>
           <a:xfrm flipH="1">
-            <a:off x="1848501" y="5989877"/>
-            <a:ext cx="6986250" cy="0"/>
+            <a:off x="1848502" y="5814760"/>
+            <a:ext cx="7219997" cy="0"/>
           </a:xfrm>
           <a:prstGeom prst="straightConnector1">
             <a:avLst/>
@@ -3880,7 +3786,7 @@
         </p:nvSpPr>
         <p:spPr>
           <a:xfrm>
-            <a:off x="2800941" y="4508531"/>
+            <a:off x="2800937" y="4319291"/>
             <a:ext cx="1853961" cy="931169"/>
           </a:xfrm>
           <a:prstGeom prst="rect">
@@ -3952,7 +3858,7 @@
         </p:nvSpPr>
         <p:spPr>
           <a:xfrm>
-            <a:off x="2800940" y="3110930"/>
+            <a:off x="2800938" y="2818845"/>
             <a:ext cx="1853961" cy="931169"/>
           </a:xfrm>
           <a:prstGeom prst="rect">
@@ -4022,7 +3928,7 @@
         </p:nvSpPr>
         <p:spPr>
           <a:xfrm>
-            <a:off x="2800940" y="1810429"/>
+            <a:off x="2800938" y="1380875"/>
             <a:ext cx="1853961" cy="931169"/>
           </a:xfrm>
           <a:prstGeom prst="rect">
@@ -4088,10 +3994,357 @@
       </p:sp>
       <p:sp>
         <p:nvSpPr>
-          <p:cNvPr id="11" name="Rectangle 10">
-            <a:extLst>
-              <a:ext uri="{FF2B5EF4-FFF2-40B4-BE49-F238E27FC236}">
-                <a16:creationId xmlns:a16="http://schemas.microsoft.com/office/drawing/2014/main" id="{045F2C5C-307D-4C8B-808D-FBFF1320B81E}"/>
+          <p:cNvPr id="12" name="TextBox 11">
+            <a:extLst>
+              <a:ext uri="{FF2B5EF4-FFF2-40B4-BE49-F238E27FC236}">
+                <a16:creationId xmlns:a16="http://schemas.microsoft.com/office/drawing/2014/main" id="{69CD86E9-C174-410D-946D-F18601288BCC}"/>
+              </a:ext>
+            </a:extLst>
+          </p:cNvPr>
+          <p:cNvSpPr txBox="1"/>
+          <p:nvPr/>
+        </p:nvSpPr>
+        <p:spPr>
+          <a:xfrm rot="10800000">
+            <a:off x="726826" y="1660497"/>
+            <a:ext cx="461665" cy="2840409"/>
+          </a:xfrm>
+          <a:prstGeom prst="rect">
+            <a:avLst/>
+          </a:prstGeom>
+          <a:noFill/>
+        </p:spPr>
+        <p:txBody>
+          <a:bodyPr vert="eaVert" wrap="square" rtlCol="0">
+            <a:spAutoFit/>
+          </a:bodyPr>
+          <a:lstStyle/>
+          <a:p>
+            <a:pPr algn="ctr"/>
+            <a:r>
+              <a:rPr lang="en-US" dirty="0"/>
+              <a:t>Business/Domain Spectrum</a:t>
+            </a:r>
+          </a:p>
+        </p:txBody>
+      </p:sp>
+      <p:sp>
+        <p:nvSpPr>
+          <p:cNvPr id="13" name="TextBox 12">
+            <a:extLst>
+              <a:ext uri="{FF2B5EF4-FFF2-40B4-BE49-F238E27FC236}">
+                <a16:creationId xmlns:a16="http://schemas.microsoft.com/office/drawing/2014/main" id="{067665E2-1485-463D-A351-5DB69373C7A9}"/>
+              </a:ext>
+            </a:extLst>
+          </p:cNvPr>
+          <p:cNvSpPr txBox="1"/>
+          <p:nvPr/>
+        </p:nvSpPr>
+        <p:spPr>
+          <a:xfrm>
+            <a:off x="3066718" y="5914946"/>
+            <a:ext cx="4460033" cy="369332"/>
+          </a:xfrm>
+          <a:prstGeom prst="rect">
+            <a:avLst/>
+          </a:prstGeom>
+          <a:noFill/>
+        </p:spPr>
+        <p:txBody>
+          <a:bodyPr wrap="square" rtlCol="0">
+            <a:spAutoFit/>
+          </a:bodyPr>
+          <a:lstStyle/>
+          <a:p>
+            <a:pPr algn="ctr"/>
+            <a:r>
+              <a:rPr lang="en-US" dirty="0"/>
+              <a:t>Decision Bind Time Spectrum</a:t>
+            </a:r>
+          </a:p>
+        </p:txBody>
+      </p:sp>
+      <p:sp>
+        <p:nvSpPr>
+          <p:cNvPr id="14" name="TextBox 13">
+            <a:extLst>
+              <a:ext uri="{FF2B5EF4-FFF2-40B4-BE49-F238E27FC236}">
+                <a16:creationId xmlns:a16="http://schemas.microsoft.com/office/drawing/2014/main" id="{0C5402C7-7C65-4E1F-8CF3-6799BF23C05E}"/>
+              </a:ext>
+            </a:extLst>
+          </p:cNvPr>
+          <p:cNvSpPr txBox="1"/>
+          <p:nvPr/>
+        </p:nvSpPr>
+        <p:spPr>
+          <a:xfrm>
+            <a:off x="2632089" y="5418810"/>
+            <a:ext cx="2191655" cy="307777"/>
+          </a:xfrm>
+          <a:prstGeom prst="rect">
+            <a:avLst/>
+          </a:prstGeom>
+          <a:noFill/>
+        </p:spPr>
+        <p:txBody>
+          <a:bodyPr wrap="square" rtlCol="0">
+            <a:spAutoFit/>
+          </a:bodyPr>
+          <a:lstStyle/>
+          <a:p>
+            <a:pPr algn="ctr"/>
+            <a:r>
+              <a:rPr lang="en-US" sz="1400" dirty="0"/>
+              <a:t>Domain Truths</a:t>
+            </a:r>
+            <a:endParaRPr lang="en-US" dirty="0"/>
+          </a:p>
+        </p:txBody>
+      </p:sp>
+      <p:sp>
+        <p:nvSpPr>
+          <p:cNvPr id="16" name="TextBox 15">
+            <a:extLst>
+              <a:ext uri="{FF2B5EF4-FFF2-40B4-BE49-F238E27FC236}">
+                <a16:creationId xmlns:a16="http://schemas.microsoft.com/office/drawing/2014/main" id="{7D3BD3FE-8C50-4FE5-8577-189773BE4FB5}"/>
+              </a:ext>
+            </a:extLst>
+          </p:cNvPr>
+          <p:cNvSpPr txBox="1"/>
+          <p:nvPr/>
+        </p:nvSpPr>
+        <p:spPr>
+          <a:xfrm>
+            <a:off x="4823746" y="5420712"/>
+            <a:ext cx="2191655" cy="307777"/>
+          </a:xfrm>
+          <a:prstGeom prst="rect">
+            <a:avLst/>
+          </a:prstGeom>
+          <a:noFill/>
+        </p:spPr>
+        <p:txBody>
+          <a:bodyPr wrap="square" rtlCol="0">
+            <a:spAutoFit/>
+          </a:bodyPr>
+          <a:lstStyle/>
+          <a:p>
+            <a:pPr algn="ctr"/>
+            <a:r>
+              <a:rPr lang="en-US" sz="1400" dirty="0"/>
+              <a:t>Integration-time</a:t>
+            </a:r>
+            <a:endParaRPr lang="en-US" dirty="0"/>
+          </a:p>
+        </p:txBody>
+      </p:sp>
+      <p:sp>
+        <p:nvSpPr>
+          <p:cNvPr id="18" name="TextBox 17">
+            <a:extLst>
+              <a:ext uri="{FF2B5EF4-FFF2-40B4-BE49-F238E27FC236}">
+                <a16:creationId xmlns:a16="http://schemas.microsoft.com/office/drawing/2014/main" id="{C0B18649-46B5-48C6-82F7-4179A54CF67D}"/>
+              </a:ext>
+            </a:extLst>
+          </p:cNvPr>
+          <p:cNvSpPr txBox="1"/>
+          <p:nvPr/>
+        </p:nvSpPr>
+        <p:spPr>
+          <a:xfrm>
+            <a:off x="6989833" y="5418810"/>
+            <a:ext cx="2191655" cy="307777"/>
+          </a:xfrm>
+          <a:prstGeom prst="rect">
+            <a:avLst/>
+          </a:prstGeom>
+          <a:noFill/>
+        </p:spPr>
+        <p:txBody>
+          <a:bodyPr wrap="square" rtlCol="0">
+            <a:spAutoFit/>
+          </a:bodyPr>
+          <a:lstStyle/>
+          <a:p>
+            <a:pPr algn="ctr"/>
+            <a:r>
+              <a:rPr lang="en-US" sz="1400" dirty="0"/>
+              <a:t>Deploy/Runtime</a:t>
+            </a:r>
+            <a:endParaRPr lang="en-US" dirty="0"/>
+          </a:p>
+        </p:txBody>
+      </p:sp>
+      <p:sp>
+        <p:nvSpPr>
+          <p:cNvPr id="19" name="TextBox 18">
+            <a:extLst>
+              <a:ext uri="{FF2B5EF4-FFF2-40B4-BE49-F238E27FC236}">
+                <a16:creationId xmlns:a16="http://schemas.microsoft.com/office/drawing/2014/main" id="{3AA51C91-5C0A-4316-9BF2-EA5E6CCC7E0B}"/>
+              </a:ext>
+            </a:extLst>
+          </p:cNvPr>
+          <p:cNvSpPr txBox="1"/>
+          <p:nvPr/>
+        </p:nvSpPr>
+        <p:spPr>
+          <a:xfrm>
+            <a:off x="1408494" y="5901032"/>
+            <a:ext cx="1148093" cy="415498"/>
+          </a:xfrm>
+          <a:prstGeom prst="rect">
+            <a:avLst/>
+          </a:prstGeom>
+          <a:noFill/>
+        </p:spPr>
+        <p:txBody>
+          <a:bodyPr wrap="square" rtlCol="0">
+            <a:spAutoFit/>
+          </a:bodyPr>
+          <a:lstStyle/>
+          <a:p>
+            <a:r>
+              <a:rPr lang="en-US" sz="1050" dirty="0"/>
+              <a:t>General, Stable,</a:t>
+            </a:r>
+          </a:p>
+          <a:p>
+            <a:r>
+              <a:rPr lang="en-US" sz="1050" dirty="0"/>
+              <a:t>Strict Separation</a:t>
+            </a:r>
+          </a:p>
+        </p:txBody>
+      </p:sp>
+      <p:sp>
+        <p:nvSpPr>
+          <p:cNvPr id="21" name="TextBox 20">
+            <a:extLst>
+              <a:ext uri="{FF2B5EF4-FFF2-40B4-BE49-F238E27FC236}">
+                <a16:creationId xmlns:a16="http://schemas.microsoft.com/office/drawing/2014/main" id="{212A33A1-7E44-4D7B-8288-6EC4CE06D8F4}"/>
+              </a:ext>
+            </a:extLst>
+          </p:cNvPr>
+          <p:cNvSpPr txBox="1"/>
+          <p:nvPr/>
+        </p:nvSpPr>
+        <p:spPr>
+          <a:xfrm>
+            <a:off x="8353696" y="5901032"/>
+            <a:ext cx="1228529" cy="415498"/>
+          </a:xfrm>
+          <a:prstGeom prst="rect">
+            <a:avLst/>
+          </a:prstGeom>
+          <a:noFill/>
+        </p:spPr>
+        <p:txBody>
+          <a:bodyPr wrap="square" rtlCol="0">
+            <a:spAutoFit/>
+          </a:bodyPr>
+          <a:lstStyle/>
+          <a:p>
+            <a:r>
+              <a:rPr lang="en-US" sz="1050" dirty="0"/>
+              <a:t>Specific, Unstable,</a:t>
+            </a:r>
+          </a:p>
+          <a:p>
+            <a:r>
+              <a:rPr lang="en-US" sz="1050" dirty="0"/>
+              <a:t>Loose Separation</a:t>
+            </a:r>
+          </a:p>
+        </p:txBody>
+      </p:sp>
+      <p:sp>
+        <p:nvSpPr>
+          <p:cNvPr id="23" name="TextBox 22">
+            <a:extLst>
+              <a:ext uri="{FF2B5EF4-FFF2-40B4-BE49-F238E27FC236}">
+                <a16:creationId xmlns:a16="http://schemas.microsoft.com/office/drawing/2014/main" id="{A7DC223D-2AA7-4B7E-B2F7-CD0A0B35CED0}"/>
+              </a:ext>
+            </a:extLst>
+          </p:cNvPr>
+          <p:cNvSpPr txBox="1"/>
+          <p:nvPr/>
+        </p:nvSpPr>
+        <p:spPr>
+          <a:xfrm>
+            <a:off x="726826" y="1118692"/>
+            <a:ext cx="668067" cy="415498"/>
+          </a:xfrm>
+          <a:prstGeom prst="rect">
+            <a:avLst/>
+          </a:prstGeom>
+          <a:noFill/>
+        </p:spPr>
+        <p:txBody>
+          <a:bodyPr wrap="square" rtlCol="0">
+            <a:spAutoFit/>
+          </a:bodyPr>
+          <a:lstStyle/>
+          <a:p>
+            <a:r>
+              <a:rPr lang="en-US" sz="1050" dirty="0"/>
+              <a:t>Specific</a:t>
+            </a:r>
+          </a:p>
+          <a:p>
+            <a:r>
+              <a:rPr lang="en-US" sz="1050" dirty="0"/>
+              <a:t>Unstable</a:t>
+            </a:r>
+          </a:p>
+        </p:txBody>
+      </p:sp>
+      <p:sp>
+        <p:nvSpPr>
+          <p:cNvPr id="24" name="TextBox 23">
+            <a:extLst>
+              <a:ext uri="{FF2B5EF4-FFF2-40B4-BE49-F238E27FC236}">
+                <a16:creationId xmlns:a16="http://schemas.microsoft.com/office/drawing/2014/main" id="{3995A5A1-F7F3-401F-B31F-F10F70C9A880}"/>
+              </a:ext>
+            </a:extLst>
+          </p:cNvPr>
+          <p:cNvSpPr txBox="1"/>
+          <p:nvPr/>
+        </p:nvSpPr>
+        <p:spPr>
+          <a:xfrm>
+            <a:off x="698858" y="5042711"/>
+            <a:ext cx="612171" cy="415498"/>
+          </a:xfrm>
+          <a:prstGeom prst="rect">
+            <a:avLst/>
+          </a:prstGeom>
+          <a:noFill/>
+        </p:spPr>
+        <p:txBody>
+          <a:bodyPr wrap="square" rtlCol="0">
+            <a:spAutoFit/>
+          </a:bodyPr>
+          <a:lstStyle/>
+          <a:p>
+            <a:r>
+              <a:rPr lang="en-US" sz="1050" dirty="0"/>
+              <a:t>General</a:t>
+            </a:r>
+          </a:p>
+          <a:p>
+            <a:r>
+              <a:rPr lang="en-US" sz="1050" dirty="0"/>
+              <a:t>Stable</a:t>
+            </a:r>
+          </a:p>
+        </p:txBody>
+      </p:sp>
+      <p:sp>
+        <p:nvSpPr>
+          <p:cNvPr id="26" name="Rectangle 25">
+            <a:extLst>
+              <a:ext uri="{FF2B5EF4-FFF2-40B4-BE49-F238E27FC236}">
+                <a16:creationId xmlns:a16="http://schemas.microsoft.com/office/drawing/2014/main" id="{08D2590A-735B-45F6-8DAC-F21756A51B86}"/>
               </a:ext>
             </a:extLst>
           </p:cNvPr>
@@ -4100,8 +4353,225 @@
         </p:nvSpPr>
         <p:spPr>
           <a:xfrm>
-            <a:off x="2800940" y="623031"/>
-            <a:ext cx="1853961" cy="931169"/>
+            <a:off x="7389660" y="2476933"/>
+            <a:ext cx="1392002" cy="813002"/>
+          </a:xfrm>
+          <a:prstGeom prst="rect">
+            <a:avLst/>
+          </a:prstGeom>
+          <a:solidFill>
+            <a:srgbClr val="DBA2DC"/>
+          </a:solidFill>
+          <a:ln>
+            <a:noFill/>
+          </a:ln>
+        </p:spPr>
+        <p:style>
+          <a:lnRef idx="2">
+            <a:schemeClr val="accent1">
+              <a:shade val="50000"/>
+            </a:schemeClr>
+          </a:lnRef>
+          <a:fillRef idx="1">
+            <a:schemeClr val="accent1"/>
+          </a:fillRef>
+          <a:effectRef idx="0">
+            <a:schemeClr val="accent1"/>
+          </a:effectRef>
+          <a:fontRef idx="minor">
+            <a:schemeClr val="lt1"/>
+          </a:fontRef>
+        </p:style>
+        <p:txBody>
+          <a:bodyPr rtlCol="0" anchor="ctr"/>
+          <a:lstStyle/>
+          <a:p>
+            <a:pPr algn="ctr"/>
+            <a:r>
+              <a:rPr lang="en-US" dirty="0">
+                <a:solidFill>
+                  <a:schemeClr val="tx1"/>
+                </a:solidFill>
+              </a:rPr>
+              <a:t>Utilities</a:t>
+            </a:r>
+          </a:p>
+          <a:p>
+            <a:pPr algn="ctr"/>
+            <a:r>
+              <a:rPr lang="en-US" sz="1400" dirty="0">
+                <a:solidFill>
+                  <a:schemeClr val="tx1"/>
+                </a:solidFill>
+              </a:rPr>
+              <a:t>(Non-core domains)</a:t>
+            </a:r>
+          </a:p>
+        </p:txBody>
+      </p:sp>
+      <p:sp>
+        <p:nvSpPr>
+          <p:cNvPr id="7" name="TextBox 6">
+            <a:extLst>
+              <a:ext uri="{FF2B5EF4-FFF2-40B4-BE49-F238E27FC236}">
+                <a16:creationId xmlns:a16="http://schemas.microsoft.com/office/drawing/2014/main" id="{B20A032E-474E-40D9-BBB4-9F6A6F305F18}"/>
+              </a:ext>
+            </a:extLst>
+          </p:cNvPr>
+          <p:cNvSpPr txBox="1"/>
+          <p:nvPr/>
+        </p:nvSpPr>
+        <p:spPr>
+          <a:xfrm>
+            <a:off x="2632092" y="561699"/>
+            <a:ext cx="2191655" cy="369332"/>
+          </a:xfrm>
+          <a:prstGeom prst="rect">
+            <a:avLst/>
+          </a:prstGeom>
+          <a:noFill/>
+        </p:spPr>
+        <p:txBody>
+          <a:bodyPr wrap="square" rtlCol="0">
+            <a:spAutoFit/>
+          </a:bodyPr>
+          <a:lstStyle/>
+          <a:p>
+            <a:pPr algn="ctr"/>
+            <a:r>
+              <a:rPr lang="en-US" dirty="0"/>
+              <a:t>App Business Rules</a:t>
+            </a:r>
+          </a:p>
+        </p:txBody>
+      </p:sp>
+      <p:sp>
+        <p:nvSpPr>
+          <p:cNvPr id="10" name="TextBox 9">
+            <a:extLst>
+              <a:ext uri="{FF2B5EF4-FFF2-40B4-BE49-F238E27FC236}">
+                <a16:creationId xmlns:a16="http://schemas.microsoft.com/office/drawing/2014/main" id="{1DEBBFD6-9AE6-4883-A5E2-E0ACE5601D53}"/>
+              </a:ext>
+            </a:extLst>
+          </p:cNvPr>
+          <p:cNvSpPr txBox="1"/>
+          <p:nvPr/>
+        </p:nvSpPr>
+        <p:spPr>
+          <a:xfrm>
+            <a:off x="1603771" y="423199"/>
+            <a:ext cx="1148092" cy="646331"/>
+          </a:xfrm>
+          <a:prstGeom prst="rect">
+            <a:avLst/>
+          </a:prstGeom>
+          <a:noFill/>
+        </p:spPr>
+        <p:txBody>
+          <a:bodyPr wrap="square" rtlCol="0">
+            <a:spAutoFit/>
+          </a:bodyPr>
+          <a:lstStyle/>
+          <a:p>
+            <a:pPr algn="ctr"/>
+            <a:r>
+              <a:rPr lang="en-US" dirty="0"/>
+              <a:t>Enterprise Rules</a:t>
+            </a:r>
+            <a:endParaRPr lang="en-US" sz="2400" dirty="0"/>
+          </a:p>
+        </p:txBody>
+      </p:sp>
+      <p:sp>
+        <p:nvSpPr>
+          <p:cNvPr id="17" name="TextBox 16">
+            <a:extLst>
+              <a:ext uri="{FF2B5EF4-FFF2-40B4-BE49-F238E27FC236}">
+                <a16:creationId xmlns:a16="http://schemas.microsoft.com/office/drawing/2014/main" id="{EAF6CC3A-CDA0-41D1-909A-EE7F86EAEF52}"/>
+              </a:ext>
+            </a:extLst>
+          </p:cNvPr>
+          <p:cNvSpPr txBox="1"/>
+          <p:nvPr/>
+        </p:nvSpPr>
+        <p:spPr>
+          <a:xfrm>
+            <a:off x="4823746" y="563763"/>
+            <a:ext cx="2191655" cy="369332"/>
+          </a:xfrm>
+          <a:prstGeom prst="rect">
+            <a:avLst/>
+          </a:prstGeom>
+          <a:noFill/>
+        </p:spPr>
+        <p:txBody>
+          <a:bodyPr wrap="square" rtlCol="0">
+            <a:spAutoFit/>
+          </a:bodyPr>
+          <a:lstStyle/>
+          <a:p>
+            <a:pPr algn="ctr"/>
+            <a:r>
+              <a:rPr lang="en-US" dirty="0"/>
+              <a:t>Interface Adapters</a:t>
+            </a:r>
+            <a:endParaRPr lang="en-US" sz="2400" dirty="0"/>
+          </a:p>
+        </p:txBody>
+      </p:sp>
+      <p:sp>
+        <p:nvSpPr>
+          <p:cNvPr id="30" name="TextBox 29">
+            <a:extLst>
+              <a:ext uri="{FF2B5EF4-FFF2-40B4-BE49-F238E27FC236}">
+                <a16:creationId xmlns:a16="http://schemas.microsoft.com/office/drawing/2014/main" id="{693A6415-E9CA-47FD-8F6B-232ECEBF8C92}"/>
+              </a:ext>
+            </a:extLst>
+          </p:cNvPr>
+          <p:cNvSpPr txBox="1"/>
+          <p:nvPr/>
+        </p:nvSpPr>
+        <p:spPr>
+          <a:xfrm>
+            <a:off x="6887825" y="564711"/>
+            <a:ext cx="2191655" cy="369332"/>
+          </a:xfrm>
+          <a:prstGeom prst="rect">
+            <a:avLst/>
+          </a:prstGeom>
+          <a:noFill/>
+        </p:spPr>
+        <p:txBody>
+          <a:bodyPr wrap="square" rtlCol="0">
+            <a:spAutoFit/>
+          </a:bodyPr>
+          <a:lstStyle/>
+          <a:p>
+            <a:pPr algn="ctr"/>
+            <a:r>
+              <a:rPr lang="en-US" dirty="0"/>
+              <a:t>“Mechanisms”</a:t>
+            </a:r>
+            <a:endParaRPr lang="en-US" sz="2400" dirty="0"/>
+          </a:p>
+        </p:txBody>
+      </p:sp>
+      <p:sp>
+        <p:nvSpPr>
+          <p:cNvPr id="32" name="Rectangle 31">
+            <a:extLst>
+              <a:ext uri="{FF2B5EF4-FFF2-40B4-BE49-F238E27FC236}">
+                <a16:creationId xmlns:a16="http://schemas.microsoft.com/office/drawing/2014/main" id="{E4CB0373-0D4D-4F4B-93DA-3078D0A5B67E}"/>
+              </a:ext>
+            </a:extLst>
+          </p:cNvPr>
+          <p:cNvSpPr/>
+          <p:nvPr/>
+        </p:nvSpPr>
+        <p:spPr>
+          <a:xfrm>
+            <a:off x="7389660" y="1648465"/>
+            <a:ext cx="1392002" cy="761408"/>
           </a:xfrm>
           <a:prstGeom prst="rect">
             <a:avLst/>
@@ -4161,367 +4631,20 @@
       </p:sp>
       <p:sp>
         <p:nvSpPr>
-          <p:cNvPr id="12" name="TextBox 11">
-            <a:extLst>
-              <a:ext uri="{FF2B5EF4-FFF2-40B4-BE49-F238E27FC236}">
-                <a16:creationId xmlns:a16="http://schemas.microsoft.com/office/drawing/2014/main" id="{69CD86E9-C174-410D-946D-F18601288BCC}"/>
-              </a:ext>
-            </a:extLst>
-          </p:cNvPr>
-          <p:cNvSpPr txBox="1"/>
-          <p:nvPr/>
-        </p:nvSpPr>
-        <p:spPr>
-          <a:xfrm rot="10800000">
-            <a:off x="726826" y="1668122"/>
-            <a:ext cx="461665" cy="2840409"/>
-          </a:xfrm>
-          <a:prstGeom prst="rect">
-            <a:avLst/>
-          </a:prstGeom>
-          <a:noFill/>
-        </p:spPr>
-        <p:txBody>
-          <a:bodyPr vert="eaVert" wrap="square" rtlCol="0">
-            <a:spAutoFit/>
-          </a:bodyPr>
-          <a:lstStyle/>
-          <a:p>
-            <a:pPr algn="ctr"/>
-            <a:r>
-              <a:rPr lang="en-US" dirty="0"/>
-              <a:t>Business/Domain Spectrum</a:t>
-            </a:r>
-          </a:p>
-        </p:txBody>
-      </p:sp>
-      <p:sp>
-        <p:nvSpPr>
-          <p:cNvPr id="13" name="TextBox 12">
-            <a:extLst>
-              <a:ext uri="{FF2B5EF4-FFF2-40B4-BE49-F238E27FC236}">
-                <a16:creationId xmlns:a16="http://schemas.microsoft.com/office/drawing/2014/main" id="{067665E2-1485-463D-A351-5DB69373C7A9}"/>
-              </a:ext>
-            </a:extLst>
-          </p:cNvPr>
-          <p:cNvSpPr txBox="1"/>
+          <p:cNvPr id="36" name="Rectangle 35">
+            <a:extLst>
+              <a:ext uri="{FF2B5EF4-FFF2-40B4-BE49-F238E27FC236}">
+                <a16:creationId xmlns:a16="http://schemas.microsoft.com/office/drawing/2014/main" id="{BD44BD4B-7EDD-4CCA-A496-660C0EEC005F}"/>
+              </a:ext>
+            </a:extLst>
+          </p:cNvPr>
+          <p:cNvSpPr/>
           <p:nvPr/>
         </p:nvSpPr>
         <p:spPr>
           <a:xfrm>
-            <a:off x="2939143" y="6090063"/>
-            <a:ext cx="4460033" cy="369332"/>
-          </a:xfrm>
-          <a:prstGeom prst="rect">
-            <a:avLst/>
-          </a:prstGeom>
-          <a:noFill/>
-        </p:spPr>
-        <p:txBody>
-          <a:bodyPr wrap="square" rtlCol="0">
-            <a:spAutoFit/>
-          </a:bodyPr>
-          <a:lstStyle/>
-          <a:p>
-            <a:pPr algn="ctr"/>
-            <a:r>
-              <a:rPr lang="en-US" dirty="0"/>
-              <a:t>Decision Bind Time Spectrum</a:t>
-            </a:r>
-          </a:p>
-        </p:txBody>
-      </p:sp>
-      <p:sp>
-        <p:nvSpPr>
-          <p:cNvPr id="14" name="TextBox 13">
-            <a:extLst>
-              <a:ext uri="{FF2B5EF4-FFF2-40B4-BE49-F238E27FC236}">
-                <a16:creationId xmlns:a16="http://schemas.microsoft.com/office/drawing/2014/main" id="{0C5402C7-7C65-4E1F-8CF3-6799BF23C05E}"/>
-              </a:ext>
-            </a:extLst>
-          </p:cNvPr>
-          <p:cNvSpPr txBox="1"/>
-          <p:nvPr/>
-        </p:nvSpPr>
-        <p:spPr>
-          <a:xfrm>
-            <a:off x="2632092" y="5644660"/>
-            <a:ext cx="2191655" cy="307777"/>
-          </a:xfrm>
-          <a:prstGeom prst="rect">
-            <a:avLst/>
-          </a:prstGeom>
-          <a:noFill/>
-        </p:spPr>
-        <p:txBody>
-          <a:bodyPr wrap="square" rtlCol="0">
-            <a:spAutoFit/>
-          </a:bodyPr>
-          <a:lstStyle/>
-          <a:p>
-            <a:pPr algn="ctr"/>
-            <a:r>
-              <a:rPr lang="en-US" sz="1400" dirty="0"/>
-              <a:t>Domain Truths</a:t>
-            </a:r>
-            <a:endParaRPr lang="en-US" dirty="0"/>
-          </a:p>
-        </p:txBody>
-      </p:sp>
-      <p:sp>
-        <p:nvSpPr>
-          <p:cNvPr id="16" name="TextBox 15">
-            <a:extLst>
-              <a:ext uri="{FF2B5EF4-FFF2-40B4-BE49-F238E27FC236}">
-                <a16:creationId xmlns:a16="http://schemas.microsoft.com/office/drawing/2014/main" id="{7D3BD3FE-8C50-4FE5-8577-189773BE4FB5}"/>
-              </a:ext>
-            </a:extLst>
-          </p:cNvPr>
-          <p:cNvSpPr txBox="1"/>
-          <p:nvPr/>
-        </p:nvSpPr>
-        <p:spPr>
-          <a:xfrm>
-            <a:off x="4823747" y="5646102"/>
-            <a:ext cx="2191655" cy="307777"/>
-          </a:xfrm>
-          <a:prstGeom prst="rect">
-            <a:avLst/>
-          </a:prstGeom>
-          <a:noFill/>
-        </p:spPr>
-        <p:txBody>
-          <a:bodyPr wrap="square" rtlCol="0">
-            <a:spAutoFit/>
-          </a:bodyPr>
-          <a:lstStyle/>
-          <a:p>
-            <a:pPr algn="ctr"/>
-            <a:r>
-              <a:rPr lang="en-US" sz="1400"/>
-              <a:t>Integration-time</a:t>
-            </a:r>
-            <a:endParaRPr lang="en-US" dirty="0"/>
-          </a:p>
-        </p:txBody>
-      </p:sp>
-      <p:sp>
-        <p:nvSpPr>
-          <p:cNvPr id="18" name="TextBox 17">
-            <a:extLst>
-              <a:ext uri="{FF2B5EF4-FFF2-40B4-BE49-F238E27FC236}">
-                <a16:creationId xmlns:a16="http://schemas.microsoft.com/office/drawing/2014/main" id="{C0B18649-46B5-48C6-82F7-4179A54CF67D}"/>
-              </a:ext>
-            </a:extLst>
-          </p:cNvPr>
-          <p:cNvSpPr txBox="1"/>
-          <p:nvPr/>
-        </p:nvSpPr>
-        <p:spPr>
-          <a:xfrm>
-            <a:off x="6887826" y="5648166"/>
-            <a:ext cx="2191655" cy="307777"/>
-          </a:xfrm>
-          <a:prstGeom prst="rect">
-            <a:avLst/>
-          </a:prstGeom>
-          <a:noFill/>
-        </p:spPr>
-        <p:txBody>
-          <a:bodyPr wrap="square" rtlCol="0">
-            <a:spAutoFit/>
-          </a:bodyPr>
-          <a:lstStyle/>
-          <a:p>
-            <a:pPr algn="ctr"/>
-            <a:r>
-              <a:rPr lang="en-US" sz="1400" dirty="0"/>
-              <a:t>Deploy/Runtime</a:t>
-            </a:r>
-            <a:endParaRPr lang="en-US" dirty="0"/>
-          </a:p>
-        </p:txBody>
-      </p:sp>
-      <p:sp>
-        <p:nvSpPr>
-          <p:cNvPr id="19" name="TextBox 18">
-            <a:extLst>
-              <a:ext uri="{FF2B5EF4-FFF2-40B4-BE49-F238E27FC236}">
-                <a16:creationId xmlns:a16="http://schemas.microsoft.com/office/drawing/2014/main" id="{3AA51C91-5C0A-4316-9BF2-EA5E6CCC7E0B}"/>
-              </a:ext>
-            </a:extLst>
-          </p:cNvPr>
-          <p:cNvSpPr txBox="1"/>
-          <p:nvPr/>
-        </p:nvSpPr>
-        <p:spPr>
-          <a:xfrm>
-            <a:off x="1408494" y="6090063"/>
-            <a:ext cx="1148093" cy="415498"/>
-          </a:xfrm>
-          <a:prstGeom prst="rect">
-            <a:avLst/>
-          </a:prstGeom>
-          <a:noFill/>
-        </p:spPr>
-        <p:txBody>
-          <a:bodyPr wrap="square" rtlCol="0">
-            <a:spAutoFit/>
-          </a:bodyPr>
-          <a:lstStyle/>
-          <a:p>
-            <a:r>
-              <a:rPr lang="en-US" sz="1050" dirty="0"/>
-              <a:t>General, Stable,</a:t>
-            </a:r>
-          </a:p>
-          <a:p>
-            <a:r>
-              <a:rPr lang="en-US" sz="1050" dirty="0"/>
-              <a:t>Strict Separation</a:t>
-            </a:r>
-          </a:p>
-        </p:txBody>
-      </p:sp>
-      <p:sp>
-        <p:nvSpPr>
-          <p:cNvPr id="21" name="TextBox 20">
-            <a:extLst>
-              <a:ext uri="{FF2B5EF4-FFF2-40B4-BE49-F238E27FC236}">
-                <a16:creationId xmlns:a16="http://schemas.microsoft.com/office/drawing/2014/main" id="{212A33A1-7E44-4D7B-8288-6EC4CE06D8F4}"/>
-              </a:ext>
-            </a:extLst>
-          </p:cNvPr>
-          <p:cNvSpPr txBox="1"/>
-          <p:nvPr/>
-        </p:nvSpPr>
-        <p:spPr>
-          <a:xfrm>
-            <a:off x="8167398" y="6090063"/>
-            <a:ext cx="1228529" cy="415498"/>
-          </a:xfrm>
-          <a:prstGeom prst="rect">
-            <a:avLst/>
-          </a:prstGeom>
-          <a:noFill/>
-        </p:spPr>
-        <p:txBody>
-          <a:bodyPr wrap="square" rtlCol="0">
-            <a:spAutoFit/>
-          </a:bodyPr>
-          <a:lstStyle/>
-          <a:p>
-            <a:r>
-              <a:rPr lang="en-US" sz="1050" dirty="0"/>
-              <a:t>Specific, Unstable,</a:t>
-            </a:r>
-          </a:p>
-          <a:p>
-            <a:r>
-              <a:rPr lang="en-US" sz="1050" dirty="0"/>
-              <a:t>Loose Separation</a:t>
-            </a:r>
-          </a:p>
-        </p:txBody>
-      </p:sp>
-      <p:sp>
-        <p:nvSpPr>
-          <p:cNvPr id="23" name="TextBox 22">
-            <a:extLst>
-              <a:ext uri="{FF2B5EF4-FFF2-40B4-BE49-F238E27FC236}">
-                <a16:creationId xmlns:a16="http://schemas.microsoft.com/office/drawing/2014/main" id="{A7DC223D-2AA7-4B7E-B2F7-CD0A0B35CED0}"/>
-              </a:ext>
-            </a:extLst>
-          </p:cNvPr>
-          <p:cNvSpPr txBox="1"/>
-          <p:nvPr/>
-        </p:nvSpPr>
-        <p:spPr>
-          <a:xfrm>
-            <a:off x="726826" y="500751"/>
-            <a:ext cx="668067" cy="415498"/>
-          </a:xfrm>
-          <a:prstGeom prst="rect">
-            <a:avLst/>
-          </a:prstGeom>
-          <a:noFill/>
-        </p:spPr>
-        <p:txBody>
-          <a:bodyPr wrap="square" rtlCol="0">
-            <a:spAutoFit/>
-          </a:bodyPr>
-          <a:lstStyle/>
-          <a:p>
-            <a:r>
-              <a:rPr lang="en-US" sz="1050" dirty="0"/>
-              <a:t>Specific</a:t>
-            </a:r>
-          </a:p>
-          <a:p>
-            <a:r>
-              <a:rPr lang="en-US" sz="1050" dirty="0"/>
-              <a:t>Unstable</a:t>
-            </a:r>
-          </a:p>
-        </p:txBody>
-      </p:sp>
-      <p:sp>
-        <p:nvSpPr>
-          <p:cNvPr id="24" name="TextBox 23">
-            <a:extLst>
-              <a:ext uri="{FF2B5EF4-FFF2-40B4-BE49-F238E27FC236}">
-                <a16:creationId xmlns:a16="http://schemas.microsoft.com/office/drawing/2014/main" id="{3995A5A1-F7F3-401F-B31F-F10F70C9A880}"/>
-              </a:ext>
-            </a:extLst>
-          </p:cNvPr>
-          <p:cNvSpPr txBox="1"/>
-          <p:nvPr/>
-        </p:nvSpPr>
-        <p:spPr>
-          <a:xfrm>
-            <a:off x="698858" y="5351245"/>
-            <a:ext cx="612171" cy="415498"/>
-          </a:xfrm>
-          <a:prstGeom prst="rect">
-            <a:avLst/>
-          </a:prstGeom>
-          <a:noFill/>
-        </p:spPr>
-        <p:txBody>
-          <a:bodyPr wrap="square" rtlCol="0">
-            <a:spAutoFit/>
-          </a:bodyPr>
-          <a:lstStyle/>
-          <a:p>
-            <a:r>
-              <a:rPr lang="en-US" sz="1050" dirty="0"/>
-              <a:t>General</a:t>
-            </a:r>
-          </a:p>
-          <a:p>
-            <a:r>
-              <a:rPr lang="en-US" sz="1050" dirty="0"/>
-              <a:t>Stable</a:t>
-            </a:r>
-          </a:p>
-        </p:txBody>
-      </p:sp>
-      <p:sp>
-        <p:nvSpPr>
-          <p:cNvPr id="26" name="Rectangle 25">
-            <a:extLst>
-              <a:ext uri="{FF2B5EF4-FFF2-40B4-BE49-F238E27FC236}">
-                <a16:creationId xmlns:a16="http://schemas.microsoft.com/office/drawing/2014/main" id="{08D2590A-735B-45F6-8DAC-F21756A51B86}"/>
-              </a:ext>
-            </a:extLst>
-          </p:cNvPr>
-          <p:cNvSpPr/>
-          <p:nvPr/>
-        </p:nvSpPr>
-        <p:spPr>
-          <a:xfrm>
-            <a:off x="7155815" y="2030298"/>
-            <a:ext cx="1853961" cy="931169"/>
+            <a:off x="7366764" y="4571814"/>
+            <a:ext cx="1392002" cy="813002"/>
           </a:xfrm>
           <a:prstGeom prst="rect">
             <a:avLst/>
@@ -4571,183 +4694,33 @@
                   <a:schemeClr val="tx1"/>
                 </a:solidFill>
               </a:rPr>
-              <a:t>(External domains)</a:t>
-            </a:r>
-          </a:p>
-        </p:txBody>
-      </p:sp>
-      <p:sp>
-        <p:nvSpPr>
-          <p:cNvPr id="7" name="TextBox 6">
-            <a:extLst>
-              <a:ext uri="{FF2B5EF4-FFF2-40B4-BE49-F238E27FC236}">
-                <a16:creationId xmlns:a16="http://schemas.microsoft.com/office/drawing/2014/main" id="{B20A032E-474E-40D9-BBB4-9F6A6F305F18}"/>
-              </a:ext>
-            </a:extLst>
-          </p:cNvPr>
-          <p:cNvSpPr txBox="1"/>
+              <a:t>(Non-core domains)</a:t>
+            </a:r>
+          </a:p>
+        </p:txBody>
+      </p:sp>
+      <p:sp>
+        <p:nvSpPr>
+          <p:cNvPr id="37" name="Rectangle 36">
+            <a:extLst>
+              <a:ext uri="{FF2B5EF4-FFF2-40B4-BE49-F238E27FC236}">
+                <a16:creationId xmlns:a16="http://schemas.microsoft.com/office/drawing/2014/main" id="{6266D5AE-66E1-4795-B86F-6DA72E0BD69D}"/>
+              </a:ext>
+            </a:extLst>
+          </p:cNvPr>
+          <p:cNvSpPr/>
           <p:nvPr/>
         </p:nvSpPr>
         <p:spPr>
           <a:xfrm>
-            <a:off x="2632092" y="91915"/>
-            <a:ext cx="2191655" cy="369332"/>
-          </a:xfrm>
-          <a:prstGeom prst="rect">
-            <a:avLst/>
-          </a:prstGeom>
-          <a:noFill/>
-        </p:spPr>
-        <p:txBody>
-          <a:bodyPr wrap="square" rtlCol="0">
-            <a:spAutoFit/>
-          </a:bodyPr>
-          <a:lstStyle/>
-          <a:p>
-            <a:pPr algn="ctr"/>
-            <a:r>
-              <a:rPr lang="en-US" dirty="0"/>
-              <a:t>App Business Rules</a:t>
-            </a:r>
-          </a:p>
-        </p:txBody>
-      </p:sp>
-      <p:sp>
-        <p:nvSpPr>
-          <p:cNvPr id="10" name="TextBox 9">
-            <a:extLst>
-              <a:ext uri="{FF2B5EF4-FFF2-40B4-BE49-F238E27FC236}">
-                <a16:creationId xmlns:a16="http://schemas.microsoft.com/office/drawing/2014/main" id="{1DEBBFD6-9AE6-4883-A5E2-E0ACE5601D53}"/>
-              </a:ext>
-            </a:extLst>
-          </p:cNvPr>
-          <p:cNvSpPr txBox="1"/>
-          <p:nvPr/>
-        </p:nvSpPr>
-        <p:spPr>
-          <a:xfrm>
-            <a:off x="1603771" y="-46585"/>
-            <a:ext cx="1148092" cy="646331"/>
-          </a:xfrm>
-          <a:prstGeom prst="rect">
-            <a:avLst/>
-          </a:prstGeom>
-          <a:noFill/>
-        </p:spPr>
-        <p:txBody>
-          <a:bodyPr wrap="square" rtlCol="0">
-            <a:spAutoFit/>
-          </a:bodyPr>
-          <a:lstStyle/>
-          <a:p>
-            <a:pPr algn="ctr"/>
-            <a:r>
-              <a:rPr lang="en-US" dirty="0"/>
-              <a:t>Enterprise Rules</a:t>
-            </a:r>
-            <a:endParaRPr lang="en-US" sz="2400" dirty="0"/>
-          </a:p>
-        </p:txBody>
-      </p:sp>
-      <p:sp>
-        <p:nvSpPr>
-          <p:cNvPr id="17" name="TextBox 16">
-            <a:extLst>
-              <a:ext uri="{FF2B5EF4-FFF2-40B4-BE49-F238E27FC236}">
-                <a16:creationId xmlns:a16="http://schemas.microsoft.com/office/drawing/2014/main" id="{EAF6CC3A-CDA0-41D1-909A-EE7F86EAEF52}"/>
-              </a:ext>
-            </a:extLst>
-          </p:cNvPr>
-          <p:cNvSpPr txBox="1"/>
-          <p:nvPr/>
-        </p:nvSpPr>
-        <p:spPr>
-          <a:xfrm>
-            <a:off x="4823746" y="93979"/>
-            <a:ext cx="2191655" cy="369332"/>
-          </a:xfrm>
-          <a:prstGeom prst="rect">
-            <a:avLst/>
-          </a:prstGeom>
-          <a:noFill/>
-        </p:spPr>
-        <p:txBody>
-          <a:bodyPr wrap="square" rtlCol="0">
-            <a:spAutoFit/>
-          </a:bodyPr>
-          <a:lstStyle/>
-          <a:p>
-            <a:pPr algn="ctr"/>
-            <a:r>
-              <a:rPr lang="en-US" dirty="0"/>
-              <a:t>Interface Adapters</a:t>
-            </a:r>
-            <a:endParaRPr lang="en-US" sz="2400" dirty="0"/>
-          </a:p>
-        </p:txBody>
-      </p:sp>
-      <p:sp>
-        <p:nvSpPr>
-          <p:cNvPr id="30" name="TextBox 29">
-            <a:extLst>
-              <a:ext uri="{FF2B5EF4-FFF2-40B4-BE49-F238E27FC236}">
-                <a16:creationId xmlns:a16="http://schemas.microsoft.com/office/drawing/2014/main" id="{693A6415-E9CA-47FD-8F6B-232ECEBF8C92}"/>
-              </a:ext>
-            </a:extLst>
-          </p:cNvPr>
-          <p:cNvSpPr txBox="1"/>
-          <p:nvPr/>
-        </p:nvSpPr>
-        <p:spPr>
-          <a:xfrm>
-            <a:off x="6887825" y="94927"/>
-            <a:ext cx="2191655" cy="369332"/>
-          </a:xfrm>
-          <a:prstGeom prst="rect">
-            <a:avLst/>
-          </a:prstGeom>
-          <a:noFill/>
-        </p:spPr>
-        <p:txBody>
-          <a:bodyPr wrap="square" rtlCol="0">
-            <a:spAutoFit/>
-          </a:bodyPr>
-          <a:lstStyle/>
-          <a:p>
-            <a:pPr algn="ctr"/>
-            <a:r>
-              <a:rPr lang="en-US" dirty="0"/>
-              <a:t>“Mechanisms”</a:t>
-            </a:r>
-            <a:endParaRPr lang="en-US" sz="2400" dirty="0"/>
-          </a:p>
-        </p:txBody>
-      </p:sp>
-      <p:sp>
-        <p:nvSpPr>
-          <p:cNvPr id="32" name="Rectangle 31">
-            <a:extLst>
-              <a:ext uri="{FF2B5EF4-FFF2-40B4-BE49-F238E27FC236}">
-                <a16:creationId xmlns:a16="http://schemas.microsoft.com/office/drawing/2014/main" id="{E4CB0373-0D4D-4F4B-93DA-3078D0A5B67E}"/>
-              </a:ext>
-            </a:extLst>
-          </p:cNvPr>
-          <p:cNvSpPr/>
-          <p:nvPr/>
-        </p:nvSpPr>
-        <p:spPr>
-          <a:xfrm>
-            <a:off x="7155815" y="1032069"/>
-            <a:ext cx="1853961" cy="931169"/>
+            <a:off x="7366764" y="3856375"/>
+            <a:ext cx="1392003" cy="697744"/>
           </a:xfrm>
           <a:prstGeom prst="rect">
             <a:avLst/>
           </a:prstGeom>
           <a:solidFill>
-            <a:schemeClr val="accent6">
-              <a:lumMod val="60000"/>
-              <a:lumOff val="40000"/>
-            </a:schemeClr>
+            <a:schemeClr val="accent1"/>
           </a:solidFill>
           <a:ln>
             <a:noFill/>
@@ -4755,15 +4728,15 @@
         </p:spPr>
         <p:style>
           <a:lnRef idx="2">
-            <a:schemeClr val="accent1">
+            <a:schemeClr val="accent5">
               <a:shade val="50000"/>
             </a:schemeClr>
           </a:lnRef>
           <a:fillRef idx="1">
-            <a:schemeClr val="accent1"/>
+            <a:schemeClr val="accent5"/>
           </a:fillRef>
           <a:effectRef idx="0">
-            <a:schemeClr val="accent1"/>
+            <a:schemeClr val="accent5"/>
           </a:effectRef>
           <a:fontRef idx="minor">
             <a:schemeClr val="lt1"/>
@@ -4775,93 +4748,12 @@
           <a:p>
             <a:pPr algn="ctr"/>
             <a:r>
-              <a:rPr lang="en-US" dirty="0">
+              <a:rPr lang="en-US" sz="1600" dirty="0">
                 <a:solidFill>
                   <a:schemeClr val="tx1"/>
                 </a:solidFill>
               </a:rPr>
-              <a:t>Clients</a:t>
-            </a:r>
-          </a:p>
-          <a:p>
-            <a:pPr algn="ctr"/>
-            <a:r>
-              <a:rPr lang="en-US" sz="1400" dirty="0">
-                <a:solidFill>
-                  <a:schemeClr val="tx1"/>
-                </a:solidFill>
-              </a:rPr>
-              <a:t>(Consumers)</a:t>
-            </a:r>
-          </a:p>
-        </p:txBody>
-      </p:sp>
-      <p:sp>
-        <p:nvSpPr>
-          <p:cNvPr id="34" name="Rectangle 33">
-            <a:extLst>
-              <a:ext uri="{FF2B5EF4-FFF2-40B4-BE49-F238E27FC236}">
-                <a16:creationId xmlns:a16="http://schemas.microsoft.com/office/drawing/2014/main" id="{B274D0A8-DE1E-47FD-9E5C-C49804E22A1D}"/>
-              </a:ext>
-            </a:extLst>
-          </p:cNvPr>
-          <p:cNvSpPr/>
-          <p:nvPr/>
-        </p:nvSpPr>
-        <p:spPr>
-          <a:xfrm>
-            <a:off x="7155815" y="4487006"/>
-            <a:ext cx="1853961" cy="931169"/>
-          </a:xfrm>
-          <a:prstGeom prst="rect">
-            <a:avLst/>
-          </a:prstGeom>
-          <a:solidFill>
-            <a:srgbClr val="DBA2DC"/>
-          </a:solidFill>
-          <a:ln>
-            <a:noFill/>
-          </a:ln>
-        </p:spPr>
-        <p:style>
-          <a:lnRef idx="2">
-            <a:schemeClr val="accent1">
-              <a:shade val="50000"/>
-            </a:schemeClr>
-          </a:lnRef>
-          <a:fillRef idx="1">
-            <a:schemeClr val="accent1"/>
-          </a:fillRef>
-          <a:effectRef idx="0">
-            <a:schemeClr val="accent1"/>
-          </a:effectRef>
-          <a:fontRef idx="minor">
-            <a:schemeClr val="lt1"/>
-          </a:fontRef>
-        </p:style>
-        <p:txBody>
-          <a:bodyPr rtlCol="0" anchor="ctr"/>
-          <a:lstStyle/>
-          <a:p>
-            <a:pPr algn="ctr"/>
-            <a:r>
-              <a:rPr lang="en-US" dirty="0">
-                <a:solidFill>
-                  <a:schemeClr val="tx1"/>
-                </a:solidFill>
-              </a:rPr>
-              <a:t>Utilities</a:t>
-            </a:r>
-          </a:p>
-          <a:p>
-            <a:pPr algn="ctr"/>
-            <a:r>
-              <a:rPr lang="en-US" sz="1400" dirty="0">
-                <a:solidFill>
-                  <a:schemeClr val="tx1"/>
-                </a:solidFill>
-              </a:rPr>
-              <a:t>(External domains)</a:t>
+              <a:t>Frameworks, Infrastructure</a:t>
             </a:r>
           </a:p>
         </p:txBody>

</xml_diff>